<commit_message>
check red green answer
</commit_message>
<xml_diff>
--- a/report/structure.pptx
+++ b/report/structure.pptx
@@ -291,7 +291,7 @@
             <a:fld id="{257B0CCF-F6AD-424A-A5F0-93E6D42CD893}" type="datetimeFigureOut">
               <a:rPr lang="ru-RU" smtClean="0"/>
               <a:pPr/>
-              <a:t>12.03.2021</a:t>
+              <a:t>14.03.2021</a:t>
             </a:fld>
             <a:endParaRPr lang="ru-RU"/>
           </a:p>
@@ -458,7 +458,7 @@
             <a:fld id="{257B0CCF-F6AD-424A-A5F0-93E6D42CD893}" type="datetimeFigureOut">
               <a:rPr lang="ru-RU" smtClean="0"/>
               <a:pPr/>
-              <a:t>12.03.2021</a:t>
+              <a:t>14.03.2021</a:t>
             </a:fld>
             <a:endParaRPr lang="ru-RU"/>
           </a:p>
@@ -635,7 +635,7 @@
             <a:fld id="{257B0CCF-F6AD-424A-A5F0-93E6D42CD893}" type="datetimeFigureOut">
               <a:rPr lang="ru-RU" smtClean="0"/>
               <a:pPr/>
-              <a:t>12.03.2021</a:t>
+              <a:t>14.03.2021</a:t>
             </a:fld>
             <a:endParaRPr lang="ru-RU"/>
           </a:p>
@@ -802,7 +802,7 @@
             <a:fld id="{257B0CCF-F6AD-424A-A5F0-93E6D42CD893}" type="datetimeFigureOut">
               <a:rPr lang="ru-RU" smtClean="0"/>
               <a:pPr/>
-              <a:t>12.03.2021</a:t>
+              <a:t>14.03.2021</a:t>
             </a:fld>
             <a:endParaRPr lang="ru-RU"/>
           </a:p>
@@ -1045,7 +1045,7 @@
             <a:fld id="{257B0CCF-F6AD-424A-A5F0-93E6D42CD893}" type="datetimeFigureOut">
               <a:rPr lang="ru-RU" smtClean="0"/>
               <a:pPr/>
-              <a:t>12.03.2021</a:t>
+              <a:t>14.03.2021</a:t>
             </a:fld>
             <a:endParaRPr lang="ru-RU"/>
           </a:p>
@@ -1330,7 +1330,7 @@
             <a:fld id="{257B0CCF-F6AD-424A-A5F0-93E6D42CD893}" type="datetimeFigureOut">
               <a:rPr lang="ru-RU" smtClean="0"/>
               <a:pPr/>
-              <a:t>12.03.2021</a:t>
+              <a:t>14.03.2021</a:t>
             </a:fld>
             <a:endParaRPr lang="ru-RU"/>
           </a:p>
@@ -1749,7 +1749,7 @@
             <a:fld id="{257B0CCF-F6AD-424A-A5F0-93E6D42CD893}" type="datetimeFigureOut">
               <a:rPr lang="ru-RU" smtClean="0"/>
               <a:pPr/>
-              <a:t>12.03.2021</a:t>
+              <a:t>14.03.2021</a:t>
             </a:fld>
             <a:endParaRPr lang="ru-RU"/>
           </a:p>
@@ -1864,7 +1864,7 @@
             <a:fld id="{257B0CCF-F6AD-424A-A5F0-93E6D42CD893}" type="datetimeFigureOut">
               <a:rPr lang="ru-RU" smtClean="0"/>
               <a:pPr/>
-              <a:t>12.03.2021</a:t>
+              <a:t>14.03.2021</a:t>
             </a:fld>
             <a:endParaRPr lang="ru-RU"/>
           </a:p>
@@ -1956,7 +1956,7 @@
             <a:fld id="{257B0CCF-F6AD-424A-A5F0-93E6D42CD893}" type="datetimeFigureOut">
               <a:rPr lang="ru-RU" smtClean="0"/>
               <a:pPr/>
-              <a:t>12.03.2021</a:t>
+              <a:t>14.03.2021</a:t>
             </a:fld>
             <a:endParaRPr lang="ru-RU"/>
           </a:p>
@@ -2230,7 +2230,7 @@
             <a:fld id="{257B0CCF-F6AD-424A-A5F0-93E6D42CD893}" type="datetimeFigureOut">
               <a:rPr lang="ru-RU" smtClean="0"/>
               <a:pPr/>
-              <a:t>12.03.2021</a:t>
+              <a:t>14.03.2021</a:t>
             </a:fld>
             <a:endParaRPr lang="ru-RU"/>
           </a:p>
@@ -2480,7 +2480,7 @@
             <a:fld id="{257B0CCF-F6AD-424A-A5F0-93E6D42CD893}" type="datetimeFigureOut">
               <a:rPr lang="ru-RU" smtClean="0"/>
               <a:pPr/>
-              <a:t>12.03.2021</a:t>
+              <a:t>14.03.2021</a:t>
             </a:fld>
             <a:endParaRPr lang="ru-RU"/>
           </a:p>
@@ -2690,7 +2690,7 @@
             <a:fld id="{257B0CCF-F6AD-424A-A5F0-93E6D42CD893}" type="datetimeFigureOut">
               <a:rPr lang="ru-RU" smtClean="0"/>
               <a:pPr/>
-              <a:t>12.03.2021</a:t>
+              <a:t>14.03.2021</a:t>
             </a:fld>
             <a:endParaRPr lang="ru-RU"/>
           </a:p>
@@ -25352,19 +25352,7 @@
             <a:p>
               <a:r>
                 <a:rPr lang="en-US" sz="1200" smtClean="0"/>
-                <a:t>isSelected</a:t>
-              </a:r>
-              <a:r>
-                <a:rPr lang="en-US" sz="1200" smtClean="0"/>
-                <a:t> ||</a:t>
-              </a:r>
-              <a:r>
-                <a:rPr lang="en-US" sz="1200" smtClean="0"/>
-                <a:t> </a:t>
-              </a:r>
-              <a:r>
-                <a:rPr lang="en-US" sz="1200" smtClean="0"/>
-                <a:t>hover_flag</a:t>
+                <a:t>isSelected || hover_flag</a:t>
               </a:r>
               <a:endParaRPr lang="en-US" sz="1200"/>
             </a:p>

</xml_diff>

<commit_message>
add choose menu category from fetch
</commit_message>
<xml_diff>
--- a/report/structure.pptx
+++ b/report/structure.pptx
@@ -195,7 +195,8 @@
           <a:p>
             <a:fld id="{328E2C51-1E17-419C-9314-DA162E78E800}" type="datetimeFigureOut">
               <a:rPr lang="ru-RU" smtClean="0"/>
-              <a:t>24.04.2021</a:t>
+              <a:pPr/>
+              <a:t>11.05.2021</a:t>
             </a:fld>
             <a:endParaRPr lang="ru-RU"/>
           </a:p>
@@ -356,6 +357,7 @@
           <a:p>
             <a:fld id="{26DF8261-7859-4D60-9FF9-CCE46032CAF8}" type="slidenum">
               <a:rPr lang="ru-RU" smtClean="0"/>
+              <a:pPr/>
               <a:t>‹#›</a:t>
             </a:fld>
             <a:endParaRPr lang="ru-RU"/>
@@ -527,6 +529,7 @@
           <a:p>
             <a:fld id="{26DF8261-7859-4D60-9FF9-CCE46032CAF8}" type="slidenum">
               <a:rPr lang="ru-RU" smtClean="0"/>
+              <a:pPr/>
               <a:t>4</a:t>
             </a:fld>
             <a:endParaRPr lang="ru-RU"/>
@@ -723,7 +726,7 @@
             <a:fld id="{257B0CCF-F6AD-424A-A5F0-93E6D42CD893}" type="datetimeFigureOut">
               <a:rPr lang="ru-RU" smtClean="0"/>
               <a:pPr/>
-              <a:t>24.04.2021</a:t>
+              <a:t>11.05.2021</a:t>
             </a:fld>
             <a:endParaRPr lang="ru-RU"/>
           </a:p>
@@ -890,7 +893,7 @@
             <a:fld id="{257B0CCF-F6AD-424A-A5F0-93E6D42CD893}" type="datetimeFigureOut">
               <a:rPr lang="ru-RU" smtClean="0"/>
               <a:pPr/>
-              <a:t>24.04.2021</a:t>
+              <a:t>11.05.2021</a:t>
             </a:fld>
             <a:endParaRPr lang="ru-RU"/>
           </a:p>
@@ -1067,7 +1070,7 @@
             <a:fld id="{257B0CCF-F6AD-424A-A5F0-93E6D42CD893}" type="datetimeFigureOut">
               <a:rPr lang="ru-RU" smtClean="0"/>
               <a:pPr/>
-              <a:t>24.04.2021</a:t>
+              <a:t>11.05.2021</a:t>
             </a:fld>
             <a:endParaRPr lang="ru-RU"/>
           </a:p>
@@ -1234,7 +1237,7 @@
             <a:fld id="{257B0CCF-F6AD-424A-A5F0-93E6D42CD893}" type="datetimeFigureOut">
               <a:rPr lang="ru-RU" smtClean="0"/>
               <a:pPr/>
-              <a:t>24.04.2021</a:t>
+              <a:t>11.05.2021</a:t>
             </a:fld>
             <a:endParaRPr lang="ru-RU"/>
           </a:p>
@@ -1477,7 +1480,7 @@
             <a:fld id="{257B0CCF-F6AD-424A-A5F0-93E6D42CD893}" type="datetimeFigureOut">
               <a:rPr lang="ru-RU" smtClean="0"/>
               <a:pPr/>
-              <a:t>24.04.2021</a:t>
+              <a:t>11.05.2021</a:t>
             </a:fld>
             <a:endParaRPr lang="ru-RU"/>
           </a:p>
@@ -1762,7 +1765,7 @@
             <a:fld id="{257B0CCF-F6AD-424A-A5F0-93E6D42CD893}" type="datetimeFigureOut">
               <a:rPr lang="ru-RU" smtClean="0"/>
               <a:pPr/>
-              <a:t>24.04.2021</a:t>
+              <a:t>11.05.2021</a:t>
             </a:fld>
             <a:endParaRPr lang="ru-RU"/>
           </a:p>
@@ -2181,7 +2184,7 @@
             <a:fld id="{257B0CCF-F6AD-424A-A5F0-93E6D42CD893}" type="datetimeFigureOut">
               <a:rPr lang="ru-RU" smtClean="0"/>
               <a:pPr/>
-              <a:t>24.04.2021</a:t>
+              <a:t>11.05.2021</a:t>
             </a:fld>
             <a:endParaRPr lang="ru-RU"/>
           </a:p>
@@ -2296,7 +2299,7 @@
             <a:fld id="{257B0CCF-F6AD-424A-A5F0-93E6D42CD893}" type="datetimeFigureOut">
               <a:rPr lang="ru-RU" smtClean="0"/>
               <a:pPr/>
-              <a:t>24.04.2021</a:t>
+              <a:t>11.05.2021</a:t>
             </a:fld>
             <a:endParaRPr lang="ru-RU"/>
           </a:p>
@@ -2388,7 +2391,7 @@
             <a:fld id="{257B0CCF-F6AD-424A-A5F0-93E6D42CD893}" type="datetimeFigureOut">
               <a:rPr lang="ru-RU" smtClean="0"/>
               <a:pPr/>
-              <a:t>24.04.2021</a:t>
+              <a:t>11.05.2021</a:t>
             </a:fld>
             <a:endParaRPr lang="ru-RU"/>
           </a:p>
@@ -2662,7 +2665,7 @@
             <a:fld id="{257B0CCF-F6AD-424A-A5F0-93E6D42CD893}" type="datetimeFigureOut">
               <a:rPr lang="ru-RU" smtClean="0"/>
               <a:pPr/>
-              <a:t>24.04.2021</a:t>
+              <a:t>11.05.2021</a:t>
             </a:fld>
             <a:endParaRPr lang="ru-RU"/>
           </a:p>
@@ -2912,7 +2915,7 @@
             <a:fld id="{257B0CCF-F6AD-424A-A5F0-93E6D42CD893}" type="datetimeFigureOut">
               <a:rPr lang="ru-RU" smtClean="0"/>
               <a:pPr/>
-              <a:t>24.04.2021</a:t>
+              <a:t>11.05.2021</a:t>
             </a:fld>
             <a:endParaRPr lang="ru-RU"/>
           </a:p>
@@ -3122,7 +3125,7 @@
             <a:fld id="{257B0CCF-F6AD-424A-A5F0-93E6D42CD893}" type="datetimeFigureOut">
               <a:rPr lang="ru-RU" smtClean="0"/>
               <a:pPr/>
-              <a:t>24.04.2021</a:t>
+              <a:t>11.05.2021</a:t>
             </a:fld>
             <a:endParaRPr lang="ru-RU"/>
           </a:p>
@@ -12130,6 +12133,9 @@
             <a:avLst/>
           </a:prstGeom>
           <a:ln>
+            <a:solidFill>
+              <a:srgbClr val="FF0000"/>
+            </a:solidFill>
             <a:tailEnd type="arrow"/>
           </a:ln>
         </p:spPr>
@@ -20478,6 +20484,2005 @@
             <a:xfrm>
               <a:off x="-5426672" y="5657844"/>
               <a:ext cx="854577" cy="214315"/>
+            </a:xfrm>
+            <a:prstGeom prst="rect">
+              <a:avLst/>
+            </a:prstGeom>
+          </p:spPr>
+          <p:style>
+            <a:lnRef idx="2">
+              <a:schemeClr val="accent3">
+                <a:shade val="50000"/>
+              </a:schemeClr>
+            </a:lnRef>
+            <a:fillRef idx="1">
+              <a:schemeClr val="accent3"/>
+            </a:fillRef>
+            <a:effectRef idx="0">
+              <a:schemeClr val="accent3"/>
+            </a:effectRef>
+            <a:fontRef idx="minor">
+              <a:schemeClr val="lt1"/>
+            </a:fontRef>
+          </p:style>
+          <p:txBody>
+            <a:bodyPr lIns="58299" tIns="29149" rIns="58299" bIns="29149" rtlCol="0" anchor="ctr"/>
+            <a:lstStyle/>
+            <a:p>
+              <a:pPr algn="ctr"/>
+              <a:r>
+                <a:rPr lang="en-US" sz="1200" smtClean="0"/>
+                <a:t>bool</a:t>
+              </a:r>
+              <a:endParaRPr lang="ru-RU" sz="1200"/>
+            </a:p>
+          </p:txBody>
+        </p:sp>
+      </p:grpSp>
+      <p:sp>
+        <p:nvSpPr>
+          <p:cNvPr id="294" name="Прямоугольник 293"/>
+          <p:cNvSpPr/>
+          <p:nvPr/>
+        </p:nvSpPr>
+        <p:spPr>
+          <a:xfrm>
+            <a:off x="-7361540" y="6657977"/>
+            <a:ext cx="1857388" cy="249117"/>
+          </a:xfrm>
+          <a:prstGeom prst="rect">
+            <a:avLst/>
+          </a:prstGeom>
+        </p:spPr>
+        <p:style>
+          <a:lnRef idx="2">
+            <a:schemeClr val="accent6">
+              <a:shade val="50000"/>
+            </a:schemeClr>
+          </a:lnRef>
+          <a:fillRef idx="1">
+            <a:schemeClr val="accent6"/>
+          </a:fillRef>
+          <a:effectRef idx="0">
+            <a:schemeClr val="accent6"/>
+          </a:effectRef>
+          <a:fontRef idx="minor">
+            <a:schemeClr val="lt1"/>
+          </a:fontRef>
+        </p:style>
+        <p:txBody>
+          <a:bodyPr lIns="58299" tIns="29149" rIns="58299" bIns="29149" rtlCol="0" anchor="ctr"/>
+          <a:lstStyle/>
+          <a:p>
+            <a:pPr>
+              <a:buFont typeface="Arial" pitchFamily="34" charset="0"/>
+              <a:buNone/>
+            </a:pPr>
+            <a:r>
+              <a:rPr lang="en-US" sz="900" smtClean="0">
+                <a:solidFill>
+                  <a:schemeClr val="tx1"/>
+                </a:solidFill>
+              </a:rPr>
+              <a:t>getAll Category</a:t>
+            </a:r>
+            <a:r>
+              <a:rPr lang="en-US" sz="900" b="0" baseline="0" smtClean="0">
+                <a:solidFill>
+                  <a:schemeClr val="tx1"/>
+                </a:solidFill>
+              </a:rPr>
+              <a:t>()</a:t>
+            </a:r>
+            <a:endParaRPr lang="ru-RU" sz="900" b="0" baseline="0">
+              <a:solidFill>
+                <a:schemeClr val="tx1"/>
+              </a:solidFill>
+            </a:endParaRPr>
+          </a:p>
+        </p:txBody>
+      </p:sp>
+      <p:sp>
+        <p:nvSpPr>
+          <p:cNvPr id="299" name="Прямоугольник 298"/>
+          <p:cNvSpPr/>
+          <p:nvPr/>
+        </p:nvSpPr>
+        <p:spPr>
+          <a:xfrm>
+            <a:off x="-5500789" y="6657977"/>
+            <a:ext cx="996768" cy="249117"/>
+          </a:xfrm>
+          <a:prstGeom prst="rect">
+            <a:avLst/>
+          </a:prstGeom>
+        </p:spPr>
+        <p:style>
+          <a:lnRef idx="2">
+            <a:schemeClr val="accent6">
+              <a:shade val="50000"/>
+            </a:schemeClr>
+          </a:lnRef>
+          <a:fillRef idx="1">
+            <a:schemeClr val="accent6"/>
+          </a:fillRef>
+          <a:effectRef idx="0">
+            <a:schemeClr val="accent6"/>
+          </a:effectRef>
+          <a:fontRef idx="minor">
+            <a:schemeClr val="lt1"/>
+          </a:fontRef>
+        </p:style>
+        <p:txBody>
+          <a:bodyPr lIns="58299" tIns="29149" rIns="58299" bIns="29149" rtlCol="0" anchor="ctr"/>
+          <a:lstStyle/>
+          <a:p>
+            <a:pPr algn="ctr"/>
+            <a:endParaRPr lang="ru-RU" sz="1200"/>
+          </a:p>
+        </p:txBody>
+      </p:sp>
+      <p:grpSp>
+        <p:nvGrpSpPr>
+          <p:cNvPr id="313" name="Группа 312"/>
+          <p:cNvGrpSpPr/>
+          <p:nvPr/>
+        </p:nvGrpSpPr>
+        <p:grpSpPr>
+          <a:xfrm>
+            <a:off x="-7358177" y="5872159"/>
+            <a:ext cx="2786082" cy="247652"/>
+            <a:chOff x="-7360856" y="7515233"/>
+            <a:chExt cx="2786082" cy="247652"/>
+          </a:xfrm>
+        </p:grpSpPr>
+        <p:sp>
+          <p:nvSpPr>
+            <p:cNvPr id="302" name="Прямоугольник 301"/>
+            <p:cNvSpPr/>
+            <p:nvPr/>
+          </p:nvSpPr>
+          <p:spPr>
+            <a:xfrm>
+              <a:off x="-7360856" y="7515234"/>
+              <a:ext cx="977248" cy="247651"/>
+            </a:xfrm>
+            <a:prstGeom prst="rect">
+              <a:avLst/>
+            </a:prstGeom>
+          </p:spPr>
+          <p:style>
+            <a:lnRef idx="2">
+              <a:schemeClr val="accent3">
+                <a:shade val="50000"/>
+              </a:schemeClr>
+            </a:lnRef>
+            <a:fillRef idx="1">
+              <a:schemeClr val="accent3"/>
+            </a:fillRef>
+            <a:effectRef idx="0">
+              <a:schemeClr val="accent3"/>
+            </a:effectRef>
+            <a:fontRef idx="minor">
+              <a:schemeClr val="lt1"/>
+            </a:fontRef>
+          </p:style>
+          <p:txBody>
+            <a:bodyPr lIns="58299" tIns="29149" rIns="58299" bIns="29149" rtlCol="0" anchor="ctr"/>
+            <a:lstStyle/>
+            <a:p>
+              <a:pPr>
+                <a:buFont typeface="Arial" pitchFamily="34" charset="0"/>
+                <a:buChar char="•"/>
+              </a:pPr>
+              <a:r>
+                <a:rPr lang="en-US" sz="900" b="0" baseline="0" smtClean="0">
+                  <a:solidFill>
+                    <a:schemeClr val="tx1"/>
+                  </a:solidFill>
+                </a:rPr>
+                <a:t>dataCategory</a:t>
+              </a:r>
+              <a:endParaRPr lang="ru-RU" sz="900" b="0" baseline="0">
+                <a:solidFill>
+                  <a:schemeClr val="tx1"/>
+                </a:solidFill>
+              </a:endParaRPr>
+            </a:p>
+          </p:txBody>
+        </p:sp>
+        <p:sp>
+          <p:nvSpPr>
+            <p:cNvPr id="307" name="Прямоугольник 306"/>
+            <p:cNvSpPr/>
+            <p:nvPr/>
+          </p:nvSpPr>
+          <p:spPr>
+            <a:xfrm>
+              <a:off x="-6395103" y="7515234"/>
+              <a:ext cx="965752" cy="247651"/>
+            </a:xfrm>
+            <a:prstGeom prst="rect">
+              <a:avLst/>
+            </a:prstGeom>
+          </p:spPr>
+          <p:style>
+            <a:lnRef idx="2">
+              <a:schemeClr val="accent3">
+                <a:shade val="50000"/>
+              </a:schemeClr>
+            </a:lnRef>
+            <a:fillRef idx="1">
+              <a:schemeClr val="accent3"/>
+            </a:fillRef>
+            <a:effectRef idx="0">
+              <a:schemeClr val="accent3"/>
+            </a:effectRef>
+            <a:fontRef idx="minor">
+              <a:schemeClr val="lt1"/>
+            </a:fontRef>
+          </p:style>
+          <p:txBody>
+            <a:bodyPr lIns="58299" tIns="29149" rIns="58299" bIns="29149" rtlCol="0" anchor="ctr"/>
+            <a:lstStyle/>
+            <a:p>
+              <a:pPr algn="ctr"/>
+              <a:r>
+                <a:rPr lang="en-US" sz="1200" smtClean="0"/>
+                <a:t>[]</a:t>
+              </a:r>
+              <a:endParaRPr lang="ru-RU" sz="1200"/>
+            </a:p>
+          </p:txBody>
+        </p:sp>
+        <p:sp>
+          <p:nvSpPr>
+            <p:cNvPr id="310" name="Прямоугольник 309"/>
+            <p:cNvSpPr/>
+            <p:nvPr/>
+          </p:nvSpPr>
+          <p:spPr>
+            <a:xfrm>
+              <a:off x="-5429351" y="7515233"/>
+              <a:ext cx="854577" cy="214315"/>
+            </a:xfrm>
+            <a:prstGeom prst="rect">
+              <a:avLst/>
+            </a:prstGeom>
+          </p:spPr>
+          <p:style>
+            <a:lnRef idx="2">
+              <a:schemeClr val="accent3">
+                <a:shade val="50000"/>
+              </a:schemeClr>
+            </a:lnRef>
+            <a:fillRef idx="1">
+              <a:schemeClr val="accent3"/>
+            </a:fillRef>
+            <a:effectRef idx="0">
+              <a:schemeClr val="accent3"/>
+            </a:effectRef>
+            <a:fontRef idx="minor">
+              <a:schemeClr val="lt1"/>
+            </a:fontRef>
+          </p:style>
+          <p:txBody>
+            <a:bodyPr lIns="58299" tIns="29149" rIns="58299" bIns="29149" rtlCol="0" anchor="ctr"/>
+            <a:lstStyle/>
+            <a:p>
+              <a:pPr algn="ctr"/>
+              <a:r>
+                <a:rPr lang="en-US" sz="1200" smtClean="0"/>
+                <a:t>arr</a:t>
+              </a:r>
+              <a:endParaRPr lang="ru-RU" sz="1200"/>
+            </a:p>
+          </p:txBody>
+        </p:sp>
+      </p:grpSp>
+      <p:cxnSp>
+        <p:nvCxnSpPr>
+          <p:cNvPr id="317" name="Соединительная линия уступом 316"/>
+          <p:cNvCxnSpPr>
+            <a:stCxn id="294" idx="1"/>
+            <a:endCxn id="302" idx="1"/>
+          </p:cNvCxnSpPr>
+          <p:nvPr/>
+        </p:nvCxnSpPr>
+        <p:spPr>
+          <a:xfrm rot="10800000" flipH="1">
+            <a:off x="-7361541" y="5995986"/>
+            <a:ext cx="3363" cy="786550"/>
+          </a:xfrm>
+          <a:prstGeom prst="bentConnector3">
+            <a:avLst>
+              <a:gd name="adj1" fmla="val -6797502"/>
+            </a:avLst>
+          </a:prstGeom>
+          <a:ln>
+            <a:solidFill>
+              <a:srgbClr val="FF0000"/>
+            </a:solidFill>
+            <a:tailEnd type="arrow"/>
+          </a:ln>
+        </p:spPr>
+        <p:style>
+          <a:lnRef idx="1">
+            <a:schemeClr val="accent1"/>
+          </a:lnRef>
+          <a:fillRef idx="0">
+            <a:schemeClr val="accent1"/>
+          </a:fillRef>
+          <a:effectRef idx="0">
+            <a:schemeClr val="accent1"/>
+          </a:effectRef>
+          <a:fontRef idx="minor">
+            <a:schemeClr val="tx1"/>
+          </a:fontRef>
+        </p:style>
+      </p:cxnSp>
+      <p:grpSp>
+        <p:nvGrpSpPr>
+          <p:cNvPr id="346" name="Группа 345"/>
+          <p:cNvGrpSpPr/>
+          <p:nvPr/>
+        </p:nvGrpSpPr>
+        <p:grpSpPr>
+          <a:xfrm>
+            <a:off x="-3857715" y="5729283"/>
+            <a:ext cx="2786082" cy="247652"/>
+            <a:chOff x="-7360856" y="7515233"/>
+            <a:chExt cx="2786082" cy="247652"/>
+          </a:xfrm>
+        </p:grpSpPr>
+        <p:sp>
+          <p:nvSpPr>
+            <p:cNvPr id="347" name="Прямоугольник 346"/>
+            <p:cNvSpPr/>
+            <p:nvPr/>
+          </p:nvSpPr>
+          <p:spPr>
+            <a:xfrm>
+              <a:off x="-7360856" y="7515234"/>
+              <a:ext cx="977248" cy="247651"/>
+            </a:xfrm>
+            <a:prstGeom prst="rect">
+              <a:avLst/>
+            </a:prstGeom>
+          </p:spPr>
+          <p:style>
+            <a:lnRef idx="2">
+              <a:schemeClr val="accent3">
+                <a:shade val="50000"/>
+              </a:schemeClr>
+            </a:lnRef>
+            <a:fillRef idx="1">
+              <a:schemeClr val="accent3"/>
+            </a:fillRef>
+            <a:effectRef idx="0">
+              <a:schemeClr val="accent3"/>
+            </a:effectRef>
+            <a:fontRef idx="minor">
+              <a:schemeClr val="lt1"/>
+            </a:fontRef>
+          </p:style>
+          <p:txBody>
+            <a:bodyPr lIns="58299" tIns="29149" rIns="58299" bIns="29149" rtlCol="0" anchor="ctr"/>
+            <a:lstStyle/>
+            <a:p>
+              <a:pPr>
+                <a:buFont typeface="Arial" pitchFamily="34" charset="0"/>
+                <a:buChar char="•"/>
+              </a:pPr>
+              <a:r>
+                <a:rPr lang="en-US" sz="900" b="0" baseline="0" smtClean="0">
+                  <a:solidFill>
+                    <a:schemeClr val="tx1"/>
+                  </a:solidFill>
+                </a:rPr>
+                <a:t>dataCategory</a:t>
+              </a:r>
+              <a:endParaRPr lang="ru-RU" sz="900" b="0" baseline="0">
+                <a:solidFill>
+                  <a:schemeClr val="tx1"/>
+                </a:solidFill>
+              </a:endParaRPr>
+            </a:p>
+          </p:txBody>
+        </p:sp>
+        <p:sp>
+          <p:nvSpPr>
+            <p:cNvPr id="352" name="Прямоугольник 351"/>
+            <p:cNvSpPr/>
+            <p:nvPr/>
+          </p:nvSpPr>
+          <p:spPr>
+            <a:xfrm>
+              <a:off x="-6395103" y="7515234"/>
+              <a:ext cx="965752" cy="247651"/>
+            </a:xfrm>
+            <a:prstGeom prst="rect">
+              <a:avLst/>
+            </a:prstGeom>
+          </p:spPr>
+          <p:style>
+            <a:lnRef idx="2">
+              <a:schemeClr val="accent3">
+                <a:shade val="50000"/>
+              </a:schemeClr>
+            </a:lnRef>
+            <a:fillRef idx="1">
+              <a:schemeClr val="accent3"/>
+            </a:fillRef>
+            <a:effectRef idx="0">
+              <a:schemeClr val="accent3"/>
+            </a:effectRef>
+            <a:fontRef idx="minor">
+              <a:schemeClr val="lt1"/>
+            </a:fontRef>
+          </p:style>
+          <p:txBody>
+            <a:bodyPr lIns="58299" tIns="29149" rIns="58299" bIns="29149" rtlCol="0" anchor="ctr"/>
+            <a:lstStyle/>
+            <a:p>
+              <a:pPr algn="ctr"/>
+              <a:r>
+                <a:rPr lang="en-US" sz="1200" smtClean="0"/>
+                <a:t>[]</a:t>
+              </a:r>
+              <a:endParaRPr lang="ru-RU" sz="1200"/>
+            </a:p>
+          </p:txBody>
+        </p:sp>
+        <p:sp>
+          <p:nvSpPr>
+            <p:cNvPr id="354" name="Прямоугольник 353"/>
+            <p:cNvSpPr/>
+            <p:nvPr/>
+          </p:nvSpPr>
+          <p:spPr>
+            <a:xfrm>
+              <a:off x="-5429351" y="7515233"/>
+              <a:ext cx="854577" cy="214315"/>
+            </a:xfrm>
+            <a:prstGeom prst="rect">
+              <a:avLst/>
+            </a:prstGeom>
+          </p:spPr>
+          <p:style>
+            <a:lnRef idx="2">
+              <a:schemeClr val="accent3">
+                <a:shade val="50000"/>
+              </a:schemeClr>
+            </a:lnRef>
+            <a:fillRef idx="1">
+              <a:schemeClr val="accent3"/>
+            </a:fillRef>
+            <a:effectRef idx="0">
+              <a:schemeClr val="accent3"/>
+            </a:effectRef>
+            <a:fontRef idx="minor">
+              <a:schemeClr val="lt1"/>
+            </a:fontRef>
+          </p:style>
+          <p:txBody>
+            <a:bodyPr lIns="58299" tIns="29149" rIns="58299" bIns="29149" rtlCol="0" anchor="ctr"/>
+            <a:lstStyle/>
+            <a:p>
+              <a:pPr algn="ctr"/>
+              <a:r>
+                <a:rPr lang="en-US" sz="1200" smtClean="0"/>
+                <a:t>arr</a:t>
+              </a:r>
+              <a:endParaRPr lang="ru-RU" sz="1200"/>
+            </a:p>
+          </p:txBody>
+        </p:sp>
+      </p:grpSp>
+      <p:cxnSp>
+        <p:nvCxnSpPr>
+          <p:cNvPr id="358" name="Прямая со стрелкой 357"/>
+          <p:cNvCxnSpPr>
+            <a:stCxn id="310" idx="3"/>
+            <a:endCxn id="347" idx="1"/>
+          </p:cNvCxnSpPr>
+          <p:nvPr/>
+        </p:nvCxnSpPr>
+        <p:spPr>
+          <a:xfrm flipV="1">
+            <a:off x="-4572095" y="5853110"/>
+            <a:ext cx="714380" cy="126207"/>
+          </a:xfrm>
+          <a:prstGeom prst="straightConnector1">
+            <a:avLst/>
+          </a:prstGeom>
+          <a:ln>
+            <a:solidFill>
+              <a:srgbClr val="FFC000"/>
+            </a:solidFill>
+            <a:tailEnd type="arrow"/>
+          </a:ln>
+        </p:spPr>
+        <p:style>
+          <a:lnRef idx="1">
+            <a:schemeClr val="accent1"/>
+          </a:lnRef>
+          <a:fillRef idx="0">
+            <a:schemeClr val="accent1"/>
+          </a:fillRef>
+          <a:effectRef idx="0">
+            <a:schemeClr val="accent1"/>
+          </a:effectRef>
+          <a:fontRef idx="minor">
+            <a:schemeClr val="tx1"/>
+          </a:fontRef>
+        </p:style>
+      </p:cxnSp>
+      <p:cxnSp>
+        <p:nvCxnSpPr>
+          <p:cNvPr id="420" name="Соединительная линия уступом 419"/>
+          <p:cNvCxnSpPr>
+            <a:stCxn id="284" idx="3"/>
+            <a:endCxn id="416" idx="1"/>
+          </p:cNvCxnSpPr>
+          <p:nvPr/>
+        </p:nvCxnSpPr>
+        <p:spPr>
+          <a:xfrm>
+            <a:off x="-1011360" y="4500550"/>
+            <a:ext cx="1939991" cy="5143537"/>
+          </a:xfrm>
+          <a:prstGeom prst="bentConnector3">
+            <a:avLst>
+              <a:gd name="adj1" fmla="val 50000"/>
+            </a:avLst>
+          </a:prstGeom>
+          <a:ln>
+            <a:solidFill>
+              <a:schemeClr val="accent2">
+                <a:lumMod val="75000"/>
+              </a:schemeClr>
+            </a:solidFill>
+            <a:tailEnd type="arrow"/>
+          </a:ln>
+        </p:spPr>
+        <p:style>
+          <a:lnRef idx="1">
+            <a:schemeClr val="accent1"/>
+          </a:lnRef>
+          <a:fillRef idx="0">
+            <a:schemeClr val="accent1"/>
+          </a:fillRef>
+          <a:effectRef idx="0">
+            <a:schemeClr val="accent1"/>
+          </a:effectRef>
+          <a:fontRef idx="minor">
+            <a:schemeClr val="tx1"/>
+          </a:fontRef>
+        </p:style>
+      </p:cxnSp>
+      <p:cxnSp>
+        <p:nvCxnSpPr>
+          <p:cNvPr id="422" name="Соединительная линия уступом 421"/>
+          <p:cNvCxnSpPr>
+            <a:stCxn id="280" idx="3"/>
+            <a:endCxn id="413" idx="1"/>
+          </p:cNvCxnSpPr>
+          <p:nvPr/>
+        </p:nvCxnSpPr>
+        <p:spPr>
+          <a:xfrm>
+            <a:off x="-1011360" y="4748202"/>
+            <a:ext cx="1939991" cy="5143537"/>
+          </a:xfrm>
+          <a:prstGeom prst="bentConnector3">
+            <a:avLst>
+              <a:gd name="adj1" fmla="val 50000"/>
+            </a:avLst>
+          </a:prstGeom>
+          <a:ln>
+            <a:solidFill>
+              <a:schemeClr val="accent2">
+                <a:lumMod val="75000"/>
+              </a:schemeClr>
+            </a:solidFill>
+            <a:tailEnd type="arrow"/>
+          </a:ln>
+        </p:spPr>
+        <p:style>
+          <a:lnRef idx="1">
+            <a:schemeClr val="accent1"/>
+          </a:lnRef>
+          <a:fillRef idx="0">
+            <a:schemeClr val="accent1"/>
+          </a:fillRef>
+          <a:effectRef idx="0">
+            <a:schemeClr val="accent1"/>
+          </a:effectRef>
+          <a:fontRef idx="minor">
+            <a:schemeClr val="tx1"/>
+          </a:fontRef>
+        </p:style>
+      </p:cxnSp>
+      <p:cxnSp>
+        <p:nvCxnSpPr>
+          <p:cNvPr id="424" name="Соединительная линия уступом 423"/>
+          <p:cNvCxnSpPr>
+            <a:stCxn id="287" idx="3"/>
+            <a:endCxn id="379" idx="1"/>
+          </p:cNvCxnSpPr>
+          <p:nvPr/>
+        </p:nvCxnSpPr>
+        <p:spPr>
+          <a:xfrm>
+            <a:off x="-1002257" y="6210298"/>
+            <a:ext cx="1949091" cy="3929092"/>
+          </a:xfrm>
+          <a:prstGeom prst="bentConnector3">
+            <a:avLst>
+              <a:gd name="adj1" fmla="val 50000"/>
+            </a:avLst>
+          </a:prstGeom>
+          <a:ln>
+            <a:solidFill>
+              <a:schemeClr val="accent2">
+                <a:lumMod val="75000"/>
+              </a:schemeClr>
+            </a:solidFill>
+            <a:tailEnd type="arrow"/>
+          </a:ln>
+        </p:spPr>
+        <p:style>
+          <a:lnRef idx="1">
+            <a:schemeClr val="accent1"/>
+          </a:lnRef>
+          <a:fillRef idx="0">
+            <a:schemeClr val="accent1"/>
+          </a:fillRef>
+          <a:effectRef idx="0">
+            <a:schemeClr val="accent1"/>
+          </a:effectRef>
+          <a:fontRef idx="minor">
+            <a:schemeClr val="tx1"/>
+          </a:fontRef>
+        </p:style>
+      </p:cxnSp>
+      <p:grpSp>
+        <p:nvGrpSpPr>
+          <p:cNvPr id="430" name="Группа 429"/>
+          <p:cNvGrpSpPr/>
+          <p:nvPr/>
+        </p:nvGrpSpPr>
+        <p:grpSpPr>
+          <a:xfrm>
+            <a:off x="928631" y="9086869"/>
+            <a:ext cx="2864560" cy="1428760"/>
+            <a:chOff x="928631" y="9086869"/>
+            <a:chExt cx="2864560" cy="1428760"/>
+          </a:xfrm>
+        </p:grpSpPr>
+        <p:grpSp>
+          <p:nvGrpSpPr>
+            <p:cNvPr id="375" name="Группа 374"/>
+            <p:cNvGrpSpPr/>
+            <p:nvPr/>
+          </p:nvGrpSpPr>
+          <p:grpSpPr>
+            <a:xfrm>
+              <a:off x="928631" y="9086869"/>
+              <a:ext cx="2864560" cy="1176346"/>
+              <a:chOff x="-3714838" y="514309"/>
+              <a:chExt cx="2864560" cy="1176346"/>
+            </a:xfrm>
+          </p:grpSpPr>
+          <p:grpSp>
+            <p:nvGrpSpPr>
+              <p:cNvPr id="382" name="Группа 126"/>
+              <p:cNvGrpSpPr/>
+              <p:nvPr/>
+            </p:nvGrpSpPr>
+            <p:grpSpPr>
+              <a:xfrm>
+                <a:off x="-3714838" y="514309"/>
+                <a:ext cx="2846354" cy="928696"/>
+                <a:chOff x="-500098" y="285734"/>
+                <a:chExt cx="2653411" cy="1071571"/>
+              </a:xfrm>
+            </p:grpSpPr>
+            <p:sp>
+              <p:nvSpPr>
+                <p:cNvPr id="409" name="TextBox 408"/>
+                <p:cNvSpPr txBox="1"/>
+                <p:nvPr/>
+              </p:nvSpPr>
+              <p:spPr>
+                <a:xfrm>
+                  <a:off x="-500098" y="571487"/>
+                  <a:ext cx="399573" cy="227731"/>
+                </a:xfrm>
+                <a:prstGeom prst="rect">
+                  <a:avLst/>
+                </a:prstGeom>
+                <a:ln/>
+              </p:spPr>
+              <p:style>
+                <a:lnRef idx="2">
+                  <a:schemeClr val="dk1">
+                    <a:shade val="50000"/>
+                  </a:schemeClr>
+                </a:lnRef>
+                <a:fillRef idx="1">
+                  <a:schemeClr val="dk1"/>
+                </a:fillRef>
+                <a:effectRef idx="0">
+                  <a:schemeClr val="dk1"/>
+                </a:effectRef>
+                <a:fontRef idx="minor">
+                  <a:schemeClr val="lt1"/>
+                </a:fontRef>
+              </p:style>
+              <p:txBody>
+                <a:bodyPr wrap="square" lIns="58299" tIns="29149" rIns="58299" bIns="29149" rtlCol="0">
+                  <a:spAutoFit/>
+                </a:bodyPr>
+                <a:lstStyle/>
+                <a:p>
+                  <a:r>
+                    <a:rPr lang="en-US" sz="900" b="1" smtClean="0"/>
+                    <a:t>props</a:t>
+                  </a:r>
+                  <a:endParaRPr lang="ru-RU" sz="900" b="1"/>
+                </a:p>
+              </p:txBody>
+            </p:sp>
+            <p:grpSp>
+              <p:nvGrpSpPr>
+                <p:cNvPr id="410" name="Группа 54"/>
+                <p:cNvGrpSpPr/>
+                <p:nvPr/>
+              </p:nvGrpSpPr>
+              <p:grpSpPr>
+                <a:xfrm>
+                  <a:off x="-500098" y="785800"/>
+                  <a:ext cx="2653411" cy="285753"/>
+                  <a:chOff x="785786" y="3429006"/>
+                  <a:chExt cx="2653411" cy="285753"/>
+                </a:xfrm>
+              </p:grpSpPr>
+              <p:sp>
+                <p:nvSpPr>
+                  <p:cNvPr id="416" name="Прямоугольник 415"/>
+                  <p:cNvSpPr/>
+                  <p:nvPr/>
+                </p:nvSpPr>
+                <p:spPr>
+                  <a:xfrm>
+                    <a:off x="785786" y="3429007"/>
+                    <a:ext cx="867461" cy="285752"/>
+                  </a:xfrm>
+                  <a:prstGeom prst="rect">
+                    <a:avLst/>
+                  </a:prstGeom>
+                </p:spPr>
+                <p:style>
+                  <a:lnRef idx="2">
+                    <a:schemeClr val="accent3">
+                      <a:shade val="50000"/>
+                    </a:schemeClr>
+                  </a:lnRef>
+                  <a:fillRef idx="1">
+                    <a:schemeClr val="accent3"/>
+                  </a:fillRef>
+                  <a:effectRef idx="0">
+                    <a:schemeClr val="accent3"/>
+                  </a:effectRef>
+                  <a:fontRef idx="minor">
+                    <a:schemeClr val="lt1"/>
+                  </a:fontRef>
+                </p:style>
+                <p:txBody>
+                  <a:bodyPr lIns="58299" tIns="29149" rIns="58299" bIns="29149" rtlCol="0" anchor="ctr"/>
+                  <a:lstStyle/>
+                  <a:p>
+                    <a:pPr>
+                      <a:buFont typeface="Arial" pitchFamily="34" charset="0"/>
+                      <a:buChar char="•"/>
+                    </a:pPr>
+                    <a:r>
+                      <a:rPr lang="en-US" sz="900" smtClean="0">
+                        <a:solidFill>
+                          <a:schemeClr val="tx1"/>
+                        </a:solidFill>
+                      </a:rPr>
+                      <a:t>categoryView</a:t>
+                    </a:r>
+                    <a:endParaRPr lang="ru-RU" sz="900">
+                      <a:solidFill>
+                        <a:schemeClr val="tx1"/>
+                      </a:solidFill>
+                    </a:endParaRPr>
+                  </a:p>
+                </p:txBody>
+              </p:sp>
+              <p:sp>
+                <p:nvSpPr>
+                  <p:cNvPr id="417" name="Прямоугольник 416"/>
+                  <p:cNvSpPr/>
+                  <p:nvPr/>
+                </p:nvSpPr>
+                <p:spPr>
+                  <a:xfrm>
+                    <a:off x="1643043" y="3429007"/>
+                    <a:ext cx="857256" cy="285752"/>
+                  </a:xfrm>
+                  <a:prstGeom prst="rect">
+                    <a:avLst/>
+                  </a:prstGeom>
+                </p:spPr>
+                <p:style>
+                  <a:lnRef idx="2">
+                    <a:schemeClr val="accent3">
+                      <a:shade val="50000"/>
+                    </a:schemeClr>
+                  </a:lnRef>
+                  <a:fillRef idx="1">
+                    <a:schemeClr val="accent3"/>
+                  </a:fillRef>
+                  <a:effectRef idx="0">
+                    <a:schemeClr val="accent3"/>
+                  </a:effectRef>
+                  <a:fontRef idx="minor">
+                    <a:schemeClr val="lt1"/>
+                  </a:fontRef>
+                </p:style>
+                <p:txBody>
+                  <a:bodyPr lIns="58299" tIns="29149" rIns="58299" bIns="29149" rtlCol="0" anchor="ctr"/>
+                  <a:lstStyle/>
+                  <a:p>
+                    <a:pPr algn="ctr"/>
+                    <a:r>
+                      <a:rPr lang="en-US" sz="1200" smtClean="0"/>
+                      <a:t>false</a:t>
+                    </a:r>
+                    <a:endParaRPr lang="ru-RU" sz="1200"/>
+                  </a:p>
+                </p:txBody>
+              </p:sp>
+              <p:sp>
+                <p:nvSpPr>
+                  <p:cNvPr id="418" name="Прямоугольник 417"/>
+                  <p:cNvSpPr/>
+                  <p:nvPr/>
+                </p:nvSpPr>
+                <p:spPr>
+                  <a:xfrm>
+                    <a:off x="2500298" y="3429006"/>
+                    <a:ext cx="938899" cy="285752"/>
+                  </a:xfrm>
+                  <a:prstGeom prst="rect">
+                    <a:avLst/>
+                  </a:prstGeom>
+                </p:spPr>
+                <p:style>
+                  <a:lnRef idx="2">
+                    <a:schemeClr val="accent3">
+                      <a:shade val="50000"/>
+                    </a:schemeClr>
+                  </a:lnRef>
+                  <a:fillRef idx="1">
+                    <a:schemeClr val="accent3"/>
+                  </a:fillRef>
+                  <a:effectRef idx="0">
+                    <a:schemeClr val="accent3"/>
+                  </a:effectRef>
+                  <a:fontRef idx="minor">
+                    <a:schemeClr val="lt1"/>
+                  </a:fontRef>
+                </p:style>
+                <p:txBody>
+                  <a:bodyPr lIns="58299" tIns="29149" rIns="58299" bIns="29149" rtlCol="0" anchor="ctr"/>
+                  <a:lstStyle/>
+                  <a:p>
+                    <a:pPr algn="ctr"/>
+                    <a:r>
+                      <a:rPr lang="en-US" sz="1200" smtClean="0"/>
+                      <a:t>bool</a:t>
+                    </a:r>
+                    <a:endParaRPr lang="ru-RU" sz="1200"/>
+                  </a:p>
+                </p:txBody>
+              </p:sp>
+            </p:grpSp>
+            <p:grpSp>
+              <p:nvGrpSpPr>
+                <p:cNvPr id="411" name="Группа 55"/>
+                <p:cNvGrpSpPr/>
+                <p:nvPr/>
+              </p:nvGrpSpPr>
+              <p:grpSpPr>
+                <a:xfrm>
+                  <a:off x="-500098" y="1071552"/>
+                  <a:ext cx="2653411" cy="285753"/>
+                  <a:chOff x="785786" y="3429006"/>
+                  <a:chExt cx="2653411" cy="285753"/>
+                </a:xfrm>
+              </p:grpSpPr>
+              <p:sp>
+                <p:nvSpPr>
+                  <p:cNvPr id="413" name="Прямоугольник 412"/>
+                  <p:cNvSpPr/>
+                  <p:nvPr/>
+                </p:nvSpPr>
+                <p:spPr>
+                  <a:xfrm>
+                    <a:off x="785786" y="3429007"/>
+                    <a:ext cx="867461" cy="285752"/>
+                  </a:xfrm>
+                  <a:prstGeom prst="rect">
+                    <a:avLst/>
+                  </a:prstGeom>
+                </p:spPr>
+                <p:style>
+                  <a:lnRef idx="2">
+                    <a:schemeClr val="accent3">
+                      <a:shade val="50000"/>
+                    </a:schemeClr>
+                  </a:lnRef>
+                  <a:fillRef idx="1">
+                    <a:schemeClr val="accent3"/>
+                  </a:fillRef>
+                  <a:effectRef idx="0">
+                    <a:schemeClr val="accent3"/>
+                  </a:effectRef>
+                  <a:fontRef idx="minor">
+                    <a:schemeClr val="lt1"/>
+                  </a:fontRef>
+                </p:style>
+                <p:txBody>
+                  <a:bodyPr lIns="58299" tIns="29149" rIns="58299" bIns="29149" rtlCol="0" anchor="ctr"/>
+                  <a:lstStyle/>
+                  <a:p>
+                    <a:pPr>
+                      <a:buFont typeface="Arial" pitchFamily="34" charset="0"/>
+                      <a:buChar char="•"/>
+                    </a:pPr>
+                    <a:r>
+                      <a:rPr lang="en-US" sz="900" smtClean="0">
+                        <a:solidFill>
+                          <a:schemeClr val="tx1"/>
+                        </a:solidFill>
+                      </a:rPr>
+                      <a:t>idCategory</a:t>
+                    </a:r>
+                    <a:endParaRPr lang="ru-RU" sz="900" b="0" baseline="0">
+                      <a:solidFill>
+                        <a:schemeClr val="tx1"/>
+                      </a:solidFill>
+                    </a:endParaRPr>
+                  </a:p>
+                </p:txBody>
+              </p:sp>
+              <p:sp>
+                <p:nvSpPr>
+                  <p:cNvPr id="414" name="Прямоугольник 413"/>
+                  <p:cNvSpPr/>
+                  <p:nvPr/>
+                </p:nvSpPr>
+                <p:spPr>
+                  <a:xfrm>
+                    <a:off x="1643043" y="3429007"/>
+                    <a:ext cx="857256" cy="285752"/>
+                  </a:xfrm>
+                  <a:prstGeom prst="rect">
+                    <a:avLst/>
+                  </a:prstGeom>
+                </p:spPr>
+                <p:style>
+                  <a:lnRef idx="2">
+                    <a:schemeClr val="accent3">
+                      <a:shade val="50000"/>
+                    </a:schemeClr>
+                  </a:lnRef>
+                  <a:fillRef idx="1">
+                    <a:schemeClr val="accent3"/>
+                  </a:fillRef>
+                  <a:effectRef idx="0">
+                    <a:schemeClr val="accent3"/>
+                  </a:effectRef>
+                  <a:fontRef idx="minor">
+                    <a:schemeClr val="lt1"/>
+                  </a:fontRef>
+                </p:style>
+                <p:txBody>
+                  <a:bodyPr lIns="58299" tIns="29149" rIns="58299" bIns="29149" rtlCol="0" anchor="ctr"/>
+                  <a:lstStyle/>
+                  <a:p>
+                    <a:pPr algn="ctr"/>
+                    <a:r>
+                      <a:rPr lang="en-US" sz="1200" smtClean="0"/>
+                      <a:t>“”</a:t>
+                    </a:r>
+                    <a:endParaRPr lang="ru-RU" sz="1200"/>
+                  </a:p>
+                </p:txBody>
+              </p:sp>
+              <p:sp>
+                <p:nvSpPr>
+                  <p:cNvPr id="415" name="Прямоугольник 414"/>
+                  <p:cNvSpPr/>
+                  <p:nvPr/>
+                </p:nvSpPr>
+                <p:spPr>
+                  <a:xfrm>
+                    <a:off x="2500298" y="3429006"/>
+                    <a:ext cx="938899" cy="285752"/>
+                  </a:xfrm>
+                  <a:prstGeom prst="rect">
+                    <a:avLst/>
+                  </a:prstGeom>
+                </p:spPr>
+                <p:style>
+                  <a:lnRef idx="2">
+                    <a:schemeClr val="accent3">
+                      <a:shade val="50000"/>
+                    </a:schemeClr>
+                  </a:lnRef>
+                  <a:fillRef idx="1">
+                    <a:schemeClr val="accent3"/>
+                  </a:fillRef>
+                  <a:effectRef idx="0">
+                    <a:schemeClr val="accent3"/>
+                  </a:effectRef>
+                  <a:fontRef idx="minor">
+                    <a:schemeClr val="lt1"/>
+                  </a:fontRef>
+                </p:style>
+                <p:txBody>
+                  <a:bodyPr lIns="58299" tIns="29149" rIns="58299" bIns="29149" rtlCol="0" anchor="ctr"/>
+                  <a:lstStyle/>
+                  <a:p>
+                    <a:pPr algn="ctr"/>
+                    <a:r>
+                      <a:rPr lang="en-US" sz="1200" smtClean="0"/>
+                      <a:t>str</a:t>
+                    </a:r>
+                    <a:endParaRPr lang="ru-RU" sz="1200"/>
+                  </a:p>
+                </p:txBody>
+              </p:sp>
+            </p:grpSp>
+            <p:sp>
+              <p:nvSpPr>
+                <p:cNvPr id="412" name="TextBox 411"/>
+                <p:cNvSpPr txBox="1"/>
+                <p:nvPr/>
+              </p:nvSpPr>
+              <p:spPr>
+                <a:xfrm>
+                  <a:off x="-500098" y="285734"/>
+                  <a:ext cx="2643206" cy="316513"/>
+                </a:xfrm>
+                <a:prstGeom prst="rect">
+                  <a:avLst/>
+                </a:prstGeom>
+              </p:spPr>
+              <p:style>
+                <a:lnRef idx="2">
+                  <a:schemeClr val="accent5">
+                    <a:shade val="50000"/>
+                  </a:schemeClr>
+                </a:lnRef>
+                <a:fillRef idx="1">
+                  <a:schemeClr val="accent5"/>
+                </a:fillRef>
+                <a:effectRef idx="0">
+                  <a:schemeClr val="accent5"/>
+                </a:effectRef>
+                <a:fontRef idx="minor">
+                  <a:schemeClr val="lt1"/>
+                </a:fontRef>
+              </p:style>
+              <p:txBody>
+                <a:bodyPr wrap="square" lIns="58299" tIns="29149" rIns="58299" bIns="29149" rtlCol="0">
+                  <a:spAutoFit/>
+                </a:bodyPr>
+                <a:lstStyle/>
+                <a:p>
+                  <a:r>
+                    <a:rPr lang="en-US" sz="1400" b="1" smtClean="0"/>
+                    <a:t>MenuNodes</a:t>
+                  </a:r>
+                  <a:endParaRPr lang="ru-RU" sz="1400" b="1"/>
+                </a:p>
+              </p:txBody>
+            </p:sp>
+          </p:grpSp>
+          <p:sp>
+            <p:nvSpPr>
+              <p:cNvPr id="379" name="Прямоугольник 378"/>
+              <p:cNvSpPr/>
+              <p:nvPr/>
+            </p:nvSpPr>
+            <p:spPr>
+              <a:xfrm>
+                <a:off x="-3696635" y="1443004"/>
+                <a:ext cx="930539" cy="247651"/>
+              </a:xfrm>
+              <a:prstGeom prst="rect">
+                <a:avLst/>
+              </a:prstGeom>
+            </p:spPr>
+            <p:style>
+              <a:lnRef idx="2">
+                <a:schemeClr val="accent3">
+                  <a:shade val="50000"/>
+                </a:schemeClr>
+              </a:lnRef>
+              <a:fillRef idx="1">
+                <a:schemeClr val="accent3"/>
+              </a:fillRef>
+              <a:effectRef idx="0">
+                <a:schemeClr val="accent3"/>
+              </a:effectRef>
+              <a:fontRef idx="minor">
+                <a:schemeClr val="lt1"/>
+              </a:fontRef>
+            </p:style>
+            <p:txBody>
+              <a:bodyPr lIns="58299" tIns="29149" rIns="58299" bIns="29149" rtlCol="0" anchor="ctr"/>
+              <a:lstStyle/>
+              <a:p>
+                <a:pPr>
+                  <a:buFont typeface="Arial" pitchFamily="34" charset="0"/>
+                  <a:buChar char="•"/>
+                </a:pPr>
+                <a:r>
+                  <a:rPr lang="en-US" sz="900" smtClean="0">
+                    <a:solidFill>
+                      <a:schemeClr val="tx1"/>
+                    </a:solidFill>
+                  </a:rPr>
+                  <a:t>quizViewChange</a:t>
+                </a:r>
+                <a:endParaRPr lang="ru-RU" sz="900" b="0" baseline="0">
+                  <a:solidFill>
+                    <a:schemeClr val="tx1"/>
+                  </a:solidFill>
+                </a:endParaRPr>
+              </a:p>
+            </p:txBody>
+          </p:sp>
+          <p:sp>
+            <p:nvSpPr>
+              <p:cNvPr id="380" name="Прямоугольник 379"/>
+              <p:cNvSpPr/>
+              <p:nvPr/>
+            </p:nvSpPr>
+            <p:spPr>
+              <a:xfrm>
+                <a:off x="-2777042" y="1443004"/>
+                <a:ext cx="919592" cy="247651"/>
+              </a:xfrm>
+              <a:prstGeom prst="rect">
+                <a:avLst/>
+              </a:prstGeom>
+            </p:spPr>
+            <p:style>
+              <a:lnRef idx="2">
+                <a:schemeClr val="accent3">
+                  <a:shade val="50000"/>
+                </a:schemeClr>
+              </a:lnRef>
+              <a:fillRef idx="1">
+                <a:schemeClr val="accent3"/>
+              </a:fillRef>
+              <a:effectRef idx="0">
+                <a:schemeClr val="accent3"/>
+              </a:effectRef>
+              <a:fontRef idx="minor">
+                <a:schemeClr val="lt1"/>
+              </a:fontRef>
+            </p:style>
+            <p:txBody>
+              <a:bodyPr lIns="58299" tIns="29149" rIns="58299" bIns="29149" rtlCol="0" anchor="ctr"/>
+              <a:lstStyle/>
+              <a:p>
+                <a:pPr algn="ctr"/>
+                <a:r>
+                  <a:rPr lang="en-US" sz="1200" smtClean="0"/>
+                  <a:t>false</a:t>
+                </a:r>
+                <a:endParaRPr lang="ru-RU" sz="1200"/>
+              </a:p>
+            </p:txBody>
+          </p:sp>
+          <p:sp>
+            <p:nvSpPr>
+              <p:cNvPr id="381" name="Прямоугольник 380"/>
+              <p:cNvSpPr/>
+              <p:nvPr/>
+            </p:nvSpPr>
+            <p:spPr>
+              <a:xfrm>
+                <a:off x="-1857450" y="1443003"/>
+                <a:ext cx="1007172" cy="247651"/>
+              </a:xfrm>
+              <a:prstGeom prst="rect">
+                <a:avLst/>
+              </a:prstGeom>
+            </p:spPr>
+            <p:style>
+              <a:lnRef idx="2">
+                <a:schemeClr val="accent3">
+                  <a:shade val="50000"/>
+                </a:schemeClr>
+              </a:lnRef>
+              <a:fillRef idx="1">
+                <a:schemeClr val="accent3"/>
+              </a:fillRef>
+              <a:effectRef idx="0">
+                <a:schemeClr val="accent3"/>
+              </a:effectRef>
+              <a:fontRef idx="minor">
+                <a:schemeClr val="lt1"/>
+              </a:fontRef>
+            </p:style>
+            <p:txBody>
+              <a:bodyPr lIns="58299" tIns="29149" rIns="58299" bIns="29149" rtlCol="0" anchor="ctr"/>
+              <a:lstStyle/>
+              <a:p>
+                <a:pPr algn="ctr"/>
+                <a:r>
+                  <a:rPr lang="en-US" sz="1200" smtClean="0"/>
+                  <a:t>bool</a:t>
+                </a:r>
+                <a:endParaRPr lang="ru-RU" sz="1200"/>
+              </a:p>
+            </p:txBody>
+          </p:sp>
+        </p:grpSp>
+        <p:grpSp>
+          <p:nvGrpSpPr>
+            <p:cNvPr id="426" name="Группа 425"/>
+            <p:cNvGrpSpPr/>
+            <p:nvPr/>
+          </p:nvGrpSpPr>
+          <p:grpSpPr>
+            <a:xfrm>
+              <a:off x="1000069" y="10267977"/>
+              <a:ext cx="2786082" cy="247652"/>
+              <a:chOff x="-7360856" y="7515233"/>
+              <a:chExt cx="2786082" cy="247652"/>
+            </a:xfrm>
+          </p:grpSpPr>
+          <p:sp>
+            <p:nvSpPr>
+              <p:cNvPr id="427" name="Прямоугольник 426"/>
+              <p:cNvSpPr/>
+              <p:nvPr/>
+            </p:nvSpPr>
+            <p:spPr>
+              <a:xfrm>
+                <a:off x="-7360856" y="7515234"/>
+                <a:ext cx="977248" cy="247651"/>
+              </a:xfrm>
+              <a:prstGeom prst="rect">
+                <a:avLst/>
+              </a:prstGeom>
+            </p:spPr>
+            <p:style>
+              <a:lnRef idx="2">
+                <a:schemeClr val="accent3">
+                  <a:shade val="50000"/>
+                </a:schemeClr>
+              </a:lnRef>
+              <a:fillRef idx="1">
+                <a:schemeClr val="accent3"/>
+              </a:fillRef>
+              <a:effectRef idx="0">
+                <a:schemeClr val="accent3"/>
+              </a:effectRef>
+              <a:fontRef idx="minor">
+                <a:schemeClr val="lt1"/>
+              </a:fontRef>
+            </p:style>
+            <p:txBody>
+              <a:bodyPr lIns="58299" tIns="29149" rIns="58299" bIns="29149" rtlCol="0" anchor="ctr"/>
+              <a:lstStyle/>
+              <a:p>
+                <a:pPr>
+                  <a:buFont typeface="Arial" pitchFamily="34" charset="0"/>
+                  <a:buChar char="•"/>
+                </a:pPr>
+                <a:r>
+                  <a:rPr lang="en-US" sz="900" b="0" baseline="0" smtClean="0">
+                    <a:solidFill>
+                      <a:schemeClr val="tx1"/>
+                    </a:solidFill>
+                  </a:rPr>
+                  <a:t>dataCategory</a:t>
+                </a:r>
+                <a:endParaRPr lang="ru-RU" sz="900" b="0" baseline="0">
+                  <a:solidFill>
+                    <a:schemeClr val="tx1"/>
+                  </a:solidFill>
+                </a:endParaRPr>
+              </a:p>
+            </p:txBody>
+          </p:sp>
+          <p:sp>
+            <p:nvSpPr>
+              <p:cNvPr id="428" name="Прямоугольник 427"/>
+              <p:cNvSpPr/>
+              <p:nvPr/>
+            </p:nvSpPr>
+            <p:spPr>
+              <a:xfrm>
+                <a:off x="-6395103" y="7515234"/>
+                <a:ext cx="965752" cy="247651"/>
+              </a:xfrm>
+              <a:prstGeom prst="rect">
+                <a:avLst/>
+              </a:prstGeom>
+            </p:spPr>
+            <p:style>
+              <a:lnRef idx="2">
+                <a:schemeClr val="accent3">
+                  <a:shade val="50000"/>
+                </a:schemeClr>
+              </a:lnRef>
+              <a:fillRef idx="1">
+                <a:schemeClr val="accent3"/>
+              </a:fillRef>
+              <a:effectRef idx="0">
+                <a:schemeClr val="accent3"/>
+              </a:effectRef>
+              <a:fontRef idx="minor">
+                <a:schemeClr val="lt1"/>
+              </a:fontRef>
+            </p:style>
+            <p:txBody>
+              <a:bodyPr lIns="58299" tIns="29149" rIns="58299" bIns="29149" rtlCol="0" anchor="ctr"/>
+              <a:lstStyle/>
+              <a:p>
+                <a:pPr algn="ctr"/>
+                <a:r>
+                  <a:rPr lang="en-US" sz="1200" smtClean="0"/>
+                  <a:t>[]</a:t>
+                </a:r>
+                <a:endParaRPr lang="ru-RU" sz="1200"/>
+              </a:p>
+            </p:txBody>
+          </p:sp>
+          <p:sp>
+            <p:nvSpPr>
+              <p:cNvPr id="429" name="Прямоугольник 428"/>
+              <p:cNvSpPr/>
+              <p:nvPr/>
+            </p:nvSpPr>
+            <p:spPr>
+              <a:xfrm>
+                <a:off x="-5429351" y="7515233"/>
+                <a:ext cx="854577" cy="214315"/>
+              </a:xfrm>
+              <a:prstGeom prst="rect">
+                <a:avLst/>
+              </a:prstGeom>
+            </p:spPr>
+            <p:style>
+              <a:lnRef idx="2">
+                <a:schemeClr val="accent3">
+                  <a:shade val="50000"/>
+                </a:schemeClr>
+              </a:lnRef>
+              <a:fillRef idx="1">
+                <a:schemeClr val="accent3"/>
+              </a:fillRef>
+              <a:effectRef idx="0">
+                <a:schemeClr val="accent3"/>
+              </a:effectRef>
+              <a:fontRef idx="minor">
+                <a:schemeClr val="lt1"/>
+              </a:fontRef>
+            </p:style>
+            <p:txBody>
+              <a:bodyPr lIns="58299" tIns="29149" rIns="58299" bIns="29149" rtlCol="0" anchor="ctr"/>
+              <a:lstStyle/>
+              <a:p>
+                <a:pPr algn="ctr"/>
+                <a:r>
+                  <a:rPr lang="en-US" sz="1200" smtClean="0"/>
+                  <a:t>arr</a:t>
+                </a:r>
+                <a:endParaRPr lang="ru-RU" sz="1200"/>
+              </a:p>
+            </p:txBody>
+          </p:sp>
+        </p:grpSp>
+      </p:grpSp>
+      <p:cxnSp>
+        <p:nvCxnSpPr>
+          <p:cNvPr id="432" name="Соединительная линия уступом 431"/>
+          <p:cNvCxnSpPr>
+            <a:stCxn id="354" idx="3"/>
+            <a:endCxn id="427" idx="1"/>
+          </p:cNvCxnSpPr>
+          <p:nvPr/>
+        </p:nvCxnSpPr>
+        <p:spPr>
+          <a:xfrm>
+            <a:off x="-1071633" y="5836441"/>
+            <a:ext cx="2071702" cy="4555363"/>
+          </a:xfrm>
+          <a:prstGeom prst="bentConnector3">
+            <a:avLst>
+              <a:gd name="adj1" fmla="val 50000"/>
+            </a:avLst>
+          </a:prstGeom>
+          <a:ln>
+            <a:tailEnd type="arrow"/>
+          </a:ln>
+        </p:spPr>
+        <p:style>
+          <a:lnRef idx="1">
+            <a:schemeClr val="accent1"/>
+          </a:lnRef>
+          <a:fillRef idx="0">
+            <a:schemeClr val="accent1"/>
+          </a:fillRef>
+          <a:effectRef idx="0">
+            <a:schemeClr val="accent1"/>
+          </a:effectRef>
+          <a:fontRef idx="minor">
+            <a:schemeClr val="tx1"/>
+          </a:fontRef>
+        </p:style>
+      </p:cxnSp>
+      <p:grpSp>
+        <p:nvGrpSpPr>
+          <p:cNvPr id="434" name="Группа 374"/>
+          <p:cNvGrpSpPr/>
+          <p:nvPr/>
+        </p:nvGrpSpPr>
+        <p:grpSpPr>
+          <a:xfrm>
+            <a:off x="4571969" y="9158307"/>
+            <a:ext cx="2864560" cy="1176346"/>
+            <a:chOff x="-3714838" y="514309"/>
+            <a:chExt cx="2864560" cy="1176346"/>
+          </a:xfrm>
+        </p:grpSpPr>
+        <p:grpSp>
+          <p:nvGrpSpPr>
+            <p:cNvPr id="439" name="Группа 126"/>
+            <p:cNvGrpSpPr/>
+            <p:nvPr/>
+          </p:nvGrpSpPr>
+          <p:grpSpPr>
+            <a:xfrm>
+              <a:off x="-3714838" y="514309"/>
+              <a:ext cx="2846354" cy="928696"/>
+              <a:chOff x="-500098" y="285734"/>
+              <a:chExt cx="2653411" cy="1071571"/>
+            </a:xfrm>
+          </p:grpSpPr>
+          <p:sp>
+            <p:nvSpPr>
+              <p:cNvPr id="443" name="TextBox 442"/>
+              <p:cNvSpPr txBox="1"/>
+              <p:nvPr/>
+            </p:nvSpPr>
+            <p:spPr>
+              <a:xfrm>
+                <a:off x="-500098" y="571487"/>
+                <a:ext cx="399573" cy="227731"/>
+              </a:xfrm>
+              <a:prstGeom prst="rect">
+                <a:avLst/>
+              </a:prstGeom>
+              <a:ln/>
+            </p:spPr>
+            <p:style>
+              <a:lnRef idx="2">
+                <a:schemeClr val="dk1">
+                  <a:shade val="50000"/>
+                </a:schemeClr>
+              </a:lnRef>
+              <a:fillRef idx="1">
+                <a:schemeClr val="dk1"/>
+              </a:fillRef>
+              <a:effectRef idx="0">
+                <a:schemeClr val="dk1"/>
+              </a:effectRef>
+              <a:fontRef idx="minor">
+                <a:schemeClr val="lt1"/>
+              </a:fontRef>
+            </p:style>
+            <p:txBody>
+              <a:bodyPr wrap="square" lIns="58299" tIns="29149" rIns="58299" bIns="29149" rtlCol="0">
+                <a:spAutoFit/>
+              </a:bodyPr>
+              <a:lstStyle/>
+              <a:p>
+                <a:r>
+                  <a:rPr lang="en-US" sz="900" b="1" smtClean="0"/>
+                  <a:t>props</a:t>
+                </a:r>
+                <a:endParaRPr lang="ru-RU" sz="900" b="1"/>
+              </a:p>
+            </p:txBody>
+          </p:sp>
+          <p:grpSp>
+            <p:nvGrpSpPr>
+              <p:cNvPr id="444" name="Группа 54"/>
+              <p:cNvGrpSpPr/>
+              <p:nvPr/>
+            </p:nvGrpSpPr>
+            <p:grpSpPr>
+              <a:xfrm>
+                <a:off x="-500098" y="785800"/>
+                <a:ext cx="2653411" cy="285753"/>
+                <a:chOff x="785786" y="3429006"/>
+                <a:chExt cx="2653411" cy="285753"/>
+              </a:xfrm>
+            </p:grpSpPr>
+            <p:sp>
+              <p:nvSpPr>
+                <p:cNvPr id="450" name="Прямоугольник 449"/>
+                <p:cNvSpPr/>
+                <p:nvPr/>
+              </p:nvSpPr>
+              <p:spPr>
+                <a:xfrm>
+                  <a:off x="785786" y="3429007"/>
+                  <a:ext cx="867461" cy="285752"/>
+                </a:xfrm>
+                <a:prstGeom prst="rect">
+                  <a:avLst/>
+                </a:prstGeom>
+              </p:spPr>
+              <p:style>
+                <a:lnRef idx="2">
+                  <a:schemeClr val="accent3">
+                    <a:shade val="50000"/>
+                  </a:schemeClr>
+                </a:lnRef>
+                <a:fillRef idx="1">
+                  <a:schemeClr val="accent3"/>
+                </a:fillRef>
+                <a:effectRef idx="0">
+                  <a:schemeClr val="accent3"/>
+                </a:effectRef>
+                <a:fontRef idx="minor">
+                  <a:schemeClr val="lt1"/>
+                </a:fontRef>
+              </p:style>
+              <p:txBody>
+                <a:bodyPr lIns="58299" tIns="29149" rIns="58299" bIns="29149" rtlCol="0" anchor="ctr"/>
+                <a:lstStyle/>
+                <a:p>
+                  <a:pPr>
+                    <a:buFont typeface="Arial" pitchFamily="34" charset="0"/>
+                    <a:buChar char="•"/>
+                  </a:pPr>
+                  <a:r>
+                    <a:rPr lang="en-US" sz="900" smtClean="0">
+                      <a:solidFill>
+                        <a:schemeClr val="tx1"/>
+                      </a:solidFill>
+                    </a:rPr>
+                    <a:t>key</a:t>
+                  </a:r>
+                  <a:endParaRPr lang="ru-RU" sz="900">
+                    <a:solidFill>
+                      <a:schemeClr val="tx1"/>
+                    </a:solidFill>
+                  </a:endParaRPr>
+                </a:p>
+              </p:txBody>
+            </p:sp>
+            <p:sp>
+              <p:nvSpPr>
+                <p:cNvPr id="451" name="Прямоугольник 450"/>
+                <p:cNvSpPr/>
+                <p:nvPr/>
+              </p:nvSpPr>
+              <p:spPr>
+                <a:xfrm>
+                  <a:off x="1643043" y="3429007"/>
+                  <a:ext cx="857256" cy="285752"/>
+                </a:xfrm>
+                <a:prstGeom prst="rect">
+                  <a:avLst/>
+                </a:prstGeom>
+              </p:spPr>
+              <p:style>
+                <a:lnRef idx="2">
+                  <a:schemeClr val="accent3">
+                    <a:shade val="50000"/>
+                  </a:schemeClr>
+                </a:lnRef>
+                <a:fillRef idx="1">
+                  <a:schemeClr val="accent3"/>
+                </a:fillRef>
+                <a:effectRef idx="0">
+                  <a:schemeClr val="accent3"/>
+                </a:effectRef>
+                <a:fontRef idx="minor">
+                  <a:schemeClr val="lt1"/>
+                </a:fontRef>
+              </p:style>
+              <p:txBody>
+                <a:bodyPr lIns="58299" tIns="29149" rIns="58299" bIns="29149" rtlCol="0" anchor="ctr"/>
+                <a:lstStyle/>
+                <a:p>
+                  <a:pPr algn="ctr"/>
+                  <a:r>
+                    <a:rPr lang="en-US" sz="1200" smtClean="0"/>
+                    <a:t>false</a:t>
+                  </a:r>
+                  <a:endParaRPr lang="ru-RU" sz="1200"/>
+                </a:p>
+              </p:txBody>
+            </p:sp>
+            <p:sp>
+              <p:nvSpPr>
+                <p:cNvPr id="452" name="Прямоугольник 451"/>
+                <p:cNvSpPr/>
+                <p:nvPr/>
+              </p:nvSpPr>
+              <p:spPr>
+                <a:xfrm>
+                  <a:off x="2500298" y="3429006"/>
+                  <a:ext cx="938899" cy="285752"/>
+                </a:xfrm>
+                <a:prstGeom prst="rect">
+                  <a:avLst/>
+                </a:prstGeom>
+              </p:spPr>
+              <p:style>
+                <a:lnRef idx="2">
+                  <a:schemeClr val="accent3">
+                    <a:shade val="50000"/>
+                  </a:schemeClr>
+                </a:lnRef>
+                <a:fillRef idx="1">
+                  <a:schemeClr val="accent3"/>
+                </a:fillRef>
+                <a:effectRef idx="0">
+                  <a:schemeClr val="accent3"/>
+                </a:effectRef>
+                <a:fontRef idx="minor">
+                  <a:schemeClr val="lt1"/>
+                </a:fontRef>
+              </p:style>
+              <p:txBody>
+                <a:bodyPr lIns="58299" tIns="29149" rIns="58299" bIns="29149" rtlCol="0" anchor="ctr"/>
+                <a:lstStyle/>
+                <a:p>
+                  <a:pPr algn="ctr"/>
+                  <a:r>
+                    <a:rPr lang="en-US" sz="1200" smtClean="0"/>
+                    <a:t>bool</a:t>
+                  </a:r>
+                  <a:endParaRPr lang="ru-RU" sz="1200"/>
+                </a:p>
+              </p:txBody>
+            </p:sp>
+          </p:grpSp>
+          <p:grpSp>
+            <p:nvGrpSpPr>
+              <p:cNvPr id="445" name="Группа 55"/>
+              <p:cNvGrpSpPr/>
+              <p:nvPr/>
+            </p:nvGrpSpPr>
+            <p:grpSpPr>
+              <a:xfrm>
+                <a:off x="-500098" y="1071552"/>
+                <a:ext cx="2653411" cy="285753"/>
+                <a:chOff x="785786" y="3429006"/>
+                <a:chExt cx="2653411" cy="285753"/>
+              </a:xfrm>
+            </p:grpSpPr>
+            <p:sp>
+              <p:nvSpPr>
+                <p:cNvPr id="447" name="Прямоугольник 446"/>
+                <p:cNvSpPr/>
+                <p:nvPr/>
+              </p:nvSpPr>
+              <p:spPr>
+                <a:xfrm>
+                  <a:off x="785786" y="3429007"/>
+                  <a:ext cx="867461" cy="285752"/>
+                </a:xfrm>
+                <a:prstGeom prst="rect">
+                  <a:avLst/>
+                </a:prstGeom>
+              </p:spPr>
+              <p:style>
+                <a:lnRef idx="2">
+                  <a:schemeClr val="accent3">
+                    <a:shade val="50000"/>
+                  </a:schemeClr>
+                </a:lnRef>
+                <a:fillRef idx="1">
+                  <a:schemeClr val="accent3"/>
+                </a:fillRef>
+                <a:effectRef idx="0">
+                  <a:schemeClr val="accent3"/>
+                </a:effectRef>
+                <a:fontRef idx="minor">
+                  <a:schemeClr val="lt1"/>
+                </a:fontRef>
+              </p:style>
+              <p:txBody>
+                <a:bodyPr lIns="58299" tIns="29149" rIns="58299" bIns="29149" rtlCol="0" anchor="ctr"/>
+                <a:lstStyle/>
+                <a:p>
+                  <a:pPr>
+                    <a:buFont typeface="Arial" pitchFamily="34" charset="0"/>
+                    <a:buChar char="•"/>
+                  </a:pPr>
+                  <a:r>
+                    <a:rPr lang="en-US" sz="900" smtClean="0">
+                      <a:solidFill>
+                        <a:schemeClr val="tx1"/>
+                      </a:solidFill>
+                    </a:rPr>
+                    <a:t>element</a:t>
+                  </a:r>
+                  <a:endParaRPr lang="ru-RU" sz="900" b="0" baseline="0">
+                    <a:solidFill>
+                      <a:schemeClr val="tx1"/>
+                    </a:solidFill>
+                  </a:endParaRPr>
+                </a:p>
+              </p:txBody>
+            </p:sp>
+            <p:sp>
+              <p:nvSpPr>
+                <p:cNvPr id="448" name="Прямоугольник 447"/>
+                <p:cNvSpPr/>
+                <p:nvPr/>
+              </p:nvSpPr>
+              <p:spPr>
+                <a:xfrm>
+                  <a:off x="1643043" y="3429007"/>
+                  <a:ext cx="857256" cy="285752"/>
+                </a:xfrm>
+                <a:prstGeom prst="rect">
+                  <a:avLst/>
+                </a:prstGeom>
+              </p:spPr>
+              <p:style>
+                <a:lnRef idx="2">
+                  <a:schemeClr val="accent3">
+                    <a:shade val="50000"/>
+                  </a:schemeClr>
+                </a:lnRef>
+                <a:fillRef idx="1">
+                  <a:schemeClr val="accent3"/>
+                </a:fillRef>
+                <a:effectRef idx="0">
+                  <a:schemeClr val="accent3"/>
+                </a:effectRef>
+                <a:fontRef idx="minor">
+                  <a:schemeClr val="lt1"/>
+                </a:fontRef>
+              </p:style>
+              <p:txBody>
+                <a:bodyPr lIns="58299" tIns="29149" rIns="58299" bIns="29149" rtlCol="0" anchor="ctr"/>
+                <a:lstStyle/>
+                <a:p>
+                  <a:pPr algn="ctr"/>
+                  <a:r>
+                    <a:rPr lang="en-US" sz="1200" smtClean="0"/>
+                    <a:t>“”</a:t>
+                  </a:r>
+                  <a:endParaRPr lang="ru-RU" sz="1200"/>
+                </a:p>
+              </p:txBody>
+            </p:sp>
+            <p:sp>
+              <p:nvSpPr>
+                <p:cNvPr id="449" name="Прямоугольник 448"/>
+                <p:cNvSpPr/>
+                <p:nvPr/>
+              </p:nvSpPr>
+              <p:spPr>
+                <a:xfrm>
+                  <a:off x="2500298" y="3429006"/>
+                  <a:ext cx="938899" cy="285752"/>
+                </a:xfrm>
+                <a:prstGeom prst="rect">
+                  <a:avLst/>
+                </a:prstGeom>
+              </p:spPr>
+              <p:style>
+                <a:lnRef idx="2">
+                  <a:schemeClr val="accent3">
+                    <a:shade val="50000"/>
+                  </a:schemeClr>
+                </a:lnRef>
+                <a:fillRef idx="1">
+                  <a:schemeClr val="accent3"/>
+                </a:fillRef>
+                <a:effectRef idx="0">
+                  <a:schemeClr val="accent3"/>
+                </a:effectRef>
+                <a:fontRef idx="minor">
+                  <a:schemeClr val="lt1"/>
+                </a:fontRef>
+              </p:style>
+              <p:txBody>
+                <a:bodyPr lIns="58299" tIns="29149" rIns="58299" bIns="29149" rtlCol="0" anchor="ctr"/>
+                <a:lstStyle/>
+                <a:p>
+                  <a:pPr algn="ctr"/>
+                  <a:r>
+                    <a:rPr lang="en-US" sz="1200" smtClean="0"/>
+                    <a:t>str</a:t>
+                  </a:r>
+                  <a:endParaRPr lang="ru-RU" sz="1200"/>
+                </a:p>
+              </p:txBody>
+            </p:sp>
+          </p:grpSp>
+          <p:sp>
+            <p:nvSpPr>
+              <p:cNvPr id="446" name="TextBox 445"/>
+              <p:cNvSpPr txBox="1"/>
+              <p:nvPr/>
+            </p:nvSpPr>
+            <p:spPr>
+              <a:xfrm>
+                <a:off x="-500098" y="285734"/>
+                <a:ext cx="2643206" cy="316513"/>
+              </a:xfrm>
+              <a:prstGeom prst="rect">
+                <a:avLst/>
+              </a:prstGeom>
+            </p:spPr>
+            <p:style>
+              <a:lnRef idx="2">
+                <a:schemeClr val="accent5">
+                  <a:shade val="50000"/>
+                </a:schemeClr>
+              </a:lnRef>
+              <a:fillRef idx="1">
+                <a:schemeClr val="accent5"/>
+              </a:fillRef>
+              <a:effectRef idx="0">
+                <a:schemeClr val="accent5"/>
+              </a:effectRef>
+              <a:fontRef idx="minor">
+                <a:schemeClr val="lt1"/>
+              </a:fontRef>
+            </p:style>
+            <p:txBody>
+              <a:bodyPr wrap="square" lIns="58299" tIns="29149" rIns="58299" bIns="29149" rtlCol="0">
+                <a:spAutoFit/>
+              </a:bodyPr>
+              <a:lstStyle/>
+              <a:p>
+                <a:r>
+                  <a:rPr lang="en-US" sz="1400" b="1" smtClean="0"/>
+                  <a:t>Nodes</a:t>
+                </a:r>
+                <a:endParaRPr lang="ru-RU" sz="1400" b="1"/>
+              </a:p>
+            </p:txBody>
+          </p:sp>
+        </p:grpSp>
+        <p:sp>
+          <p:nvSpPr>
+            <p:cNvPr id="440" name="Прямоугольник 439"/>
+            <p:cNvSpPr/>
+            <p:nvPr/>
+          </p:nvSpPr>
+          <p:spPr>
+            <a:xfrm>
+              <a:off x="-3696635" y="1443004"/>
+              <a:ext cx="930539" cy="247651"/>
+            </a:xfrm>
+            <a:prstGeom prst="rect">
+              <a:avLst/>
+            </a:prstGeom>
+          </p:spPr>
+          <p:style>
+            <a:lnRef idx="2">
+              <a:schemeClr val="accent3">
+                <a:shade val="50000"/>
+              </a:schemeClr>
+            </a:lnRef>
+            <a:fillRef idx="1">
+              <a:schemeClr val="accent3"/>
+            </a:fillRef>
+            <a:effectRef idx="0">
+              <a:schemeClr val="accent3"/>
+            </a:effectRef>
+            <a:fontRef idx="minor">
+              <a:schemeClr val="lt1"/>
+            </a:fontRef>
+          </p:style>
+          <p:txBody>
+            <a:bodyPr lIns="58299" tIns="29149" rIns="58299" bIns="29149" rtlCol="0" anchor="ctr"/>
+            <a:lstStyle/>
+            <a:p>
+              <a:pPr>
+                <a:buFont typeface="Arial" pitchFamily="34" charset="0"/>
+                <a:buChar char="•"/>
+              </a:pPr>
+              <a:r>
+                <a:rPr lang="en-US" sz="900" smtClean="0">
+                  <a:solidFill>
+                    <a:schemeClr val="tx1"/>
+                  </a:solidFill>
+                </a:rPr>
+                <a:t>quizViewChange</a:t>
+              </a:r>
+              <a:endParaRPr lang="ru-RU" sz="900" b="0" baseline="0">
+                <a:solidFill>
+                  <a:schemeClr val="tx1"/>
+                </a:solidFill>
+              </a:endParaRPr>
+            </a:p>
+          </p:txBody>
+        </p:sp>
+        <p:sp>
+          <p:nvSpPr>
+            <p:cNvPr id="441" name="Прямоугольник 440"/>
+            <p:cNvSpPr/>
+            <p:nvPr/>
+          </p:nvSpPr>
+          <p:spPr>
+            <a:xfrm>
+              <a:off x="-2777042" y="1443004"/>
+              <a:ext cx="919592" cy="247651"/>
+            </a:xfrm>
+            <a:prstGeom prst="rect">
+              <a:avLst/>
+            </a:prstGeom>
+          </p:spPr>
+          <p:style>
+            <a:lnRef idx="2">
+              <a:schemeClr val="accent3">
+                <a:shade val="50000"/>
+              </a:schemeClr>
+            </a:lnRef>
+            <a:fillRef idx="1">
+              <a:schemeClr val="accent3"/>
+            </a:fillRef>
+            <a:effectRef idx="0">
+              <a:schemeClr val="accent3"/>
+            </a:effectRef>
+            <a:fontRef idx="minor">
+              <a:schemeClr val="lt1"/>
+            </a:fontRef>
+          </p:style>
+          <p:txBody>
+            <a:bodyPr lIns="58299" tIns="29149" rIns="58299" bIns="29149" rtlCol="0" anchor="ctr"/>
+            <a:lstStyle/>
+            <a:p>
+              <a:pPr algn="ctr"/>
+              <a:r>
+                <a:rPr lang="en-US" sz="1200" smtClean="0"/>
+                <a:t>false</a:t>
+              </a:r>
+              <a:endParaRPr lang="ru-RU" sz="1200"/>
+            </a:p>
+          </p:txBody>
+        </p:sp>
+        <p:sp>
+          <p:nvSpPr>
+            <p:cNvPr id="442" name="Прямоугольник 441"/>
+            <p:cNvSpPr/>
+            <p:nvPr/>
+          </p:nvSpPr>
+          <p:spPr>
+            <a:xfrm>
+              <a:off x="-1857450" y="1443003"/>
+              <a:ext cx="1007172" cy="247651"/>
             </a:xfrm>
             <a:prstGeom prst="rect">
               <a:avLst/>

</xml_diff>

<commit_message>
delete idlist list exist
</commit_message>
<xml_diff>
--- a/report/structure.pptx
+++ b/report/structure.pptx
@@ -196,7 +196,7 @@
             <a:fld id="{328E2C51-1E17-419C-9314-DA162E78E800}" type="datetimeFigureOut">
               <a:rPr lang="ru-RU" smtClean="0"/>
               <a:pPr/>
-              <a:t>11.05.2021</a:t>
+              <a:t>14.05.2021</a:t>
             </a:fld>
             <a:endParaRPr lang="ru-RU"/>
           </a:p>
@@ -726,7 +726,7 @@
             <a:fld id="{257B0CCF-F6AD-424A-A5F0-93E6D42CD893}" type="datetimeFigureOut">
               <a:rPr lang="ru-RU" smtClean="0"/>
               <a:pPr/>
-              <a:t>11.05.2021</a:t>
+              <a:t>14.05.2021</a:t>
             </a:fld>
             <a:endParaRPr lang="ru-RU"/>
           </a:p>
@@ -893,7 +893,7 @@
             <a:fld id="{257B0CCF-F6AD-424A-A5F0-93E6D42CD893}" type="datetimeFigureOut">
               <a:rPr lang="ru-RU" smtClean="0"/>
               <a:pPr/>
-              <a:t>11.05.2021</a:t>
+              <a:t>14.05.2021</a:t>
             </a:fld>
             <a:endParaRPr lang="ru-RU"/>
           </a:p>
@@ -1070,7 +1070,7 @@
             <a:fld id="{257B0CCF-F6AD-424A-A5F0-93E6D42CD893}" type="datetimeFigureOut">
               <a:rPr lang="ru-RU" smtClean="0"/>
               <a:pPr/>
-              <a:t>11.05.2021</a:t>
+              <a:t>14.05.2021</a:t>
             </a:fld>
             <a:endParaRPr lang="ru-RU"/>
           </a:p>
@@ -1237,7 +1237,7 @@
             <a:fld id="{257B0CCF-F6AD-424A-A5F0-93E6D42CD893}" type="datetimeFigureOut">
               <a:rPr lang="ru-RU" smtClean="0"/>
               <a:pPr/>
-              <a:t>11.05.2021</a:t>
+              <a:t>14.05.2021</a:t>
             </a:fld>
             <a:endParaRPr lang="ru-RU"/>
           </a:p>
@@ -1480,7 +1480,7 @@
             <a:fld id="{257B0CCF-F6AD-424A-A5F0-93E6D42CD893}" type="datetimeFigureOut">
               <a:rPr lang="ru-RU" smtClean="0"/>
               <a:pPr/>
-              <a:t>11.05.2021</a:t>
+              <a:t>14.05.2021</a:t>
             </a:fld>
             <a:endParaRPr lang="ru-RU"/>
           </a:p>
@@ -1765,7 +1765,7 @@
             <a:fld id="{257B0CCF-F6AD-424A-A5F0-93E6D42CD893}" type="datetimeFigureOut">
               <a:rPr lang="ru-RU" smtClean="0"/>
               <a:pPr/>
-              <a:t>11.05.2021</a:t>
+              <a:t>14.05.2021</a:t>
             </a:fld>
             <a:endParaRPr lang="ru-RU"/>
           </a:p>
@@ -2184,7 +2184,7 @@
             <a:fld id="{257B0CCF-F6AD-424A-A5F0-93E6D42CD893}" type="datetimeFigureOut">
               <a:rPr lang="ru-RU" smtClean="0"/>
               <a:pPr/>
-              <a:t>11.05.2021</a:t>
+              <a:t>14.05.2021</a:t>
             </a:fld>
             <a:endParaRPr lang="ru-RU"/>
           </a:p>
@@ -2299,7 +2299,7 @@
             <a:fld id="{257B0CCF-F6AD-424A-A5F0-93E6D42CD893}" type="datetimeFigureOut">
               <a:rPr lang="ru-RU" smtClean="0"/>
               <a:pPr/>
-              <a:t>11.05.2021</a:t>
+              <a:t>14.05.2021</a:t>
             </a:fld>
             <a:endParaRPr lang="ru-RU"/>
           </a:p>
@@ -2391,7 +2391,7 @@
             <a:fld id="{257B0CCF-F6AD-424A-A5F0-93E6D42CD893}" type="datetimeFigureOut">
               <a:rPr lang="ru-RU" smtClean="0"/>
               <a:pPr/>
-              <a:t>11.05.2021</a:t>
+              <a:t>14.05.2021</a:t>
             </a:fld>
             <a:endParaRPr lang="ru-RU"/>
           </a:p>
@@ -2665,7 +2665,7 @@
             <a:fld id="{257B0CCF-F6AD-424A-A5F0-93E6D42CD893}" type="datetimeFigureOut">
               <a:rPr lang="ru-RU" smtClean="0"/>
               <a:pPr/>
-              <a:t>11.05.2021</a:t>
+              <a:t>14.05.2021</a:t>
             </a:fld>
             <a:endParaRPr lang="ru-RU"/>
           </a:p>
@@ -2915,7 +2915,7 @@
             <a:fld id="{257B0CCF-F6AD-424A-A5F0-93E6D42CD893}" type="datetimeFigureOut">
               <a:rPr lang="ru-RU" smtClean="0"/>
               <a:pPr/>
-              <a:t>11.05.2021</a:t>
+              <a:t>14.05.2021</a:t>
             </a:fld>
             <a:endParaRPr lang="ru-RU"/>
           </a:p>
@@ -3125,7 +3125,7 @@
             <a:fld id="{257B0CCF-F6AD-424A-A5F0-93E6D42CD893}" type="datetimeFigureOut">
               <a:rPr lang="ru-RU" smtClean="0"/>
               <a:pPr/>
-              <a:t>11.05.2021</a:t>
+              <a:t>14.05.2021</a:t>
             </a:fld>
             <a:endParaRPr lang="ru-RU"/>
           </a:p>
@@ -11106,322 +11106,6 @@
           </p:grpSp>
           <p:grpSp>
             <p:nvGrpSpPr>
-              <p:cNvPr id="246" name="Группа 217"/>
-              <p:cNvGrpSpPr/>
-              <p:nvPr/>
-            </p:nvGrpSpPr>
-            <p:grpSpPr>
-              <a:xfrm>
-                <a:off x="-7572491" y="1443003"/>
-                <a:ext cx="2846357" cy="247652"/>
-                <a:chOff x="-7411412" y="2300259"/>
-                <a:chExt cx="2846357" cy="247652"/>
-              </a:xfrm>
-            </p:grpSpPr>
-            <p:sp>
-              <p:nvSpPr>
-                <p:cNvPr id="269" name="Прямоугольник 268"/>
-                <p:cNvSpPr/>
-                <p:nvPr/>
-              </p:nvSpPr>
-              <p:spPr>
-                <a:xfrm>
-                  <a:off x="-7411412" y="2300260"/>
-                  <a:ext cx="930539" cy="247651"/>
-                </a:xfrm>
-                <a:prstGeom prst="rect">
-                  <a:avLst/>
-                </a:prstGeom>
-              </p:spPr>
-              <p:style>
-                <a:lnRef idx="2">
-                  <a:schemeClr val="accent3">
-                    <a:shade val="50000"/>
-                  </a:schemeClr>
-                </a:lnRef>
-                <a:fillRef idx="1">
-                  <a:schemeClr val="accent3"/>
-                </a:fillRef>
-                <a:effectRef idx="0">
-                  <a:schemeClr val="accent3"/>
-                </a:effectRef>
-                <a:fontRef idx="minor">
-                  <a:schemeClr val="lt1"/>
-                </a:fontRef>
-              </p:style>
-              <p:txBody>
-                <a:bodyPr lIns="58299" tIns="29149" rIns="58299" bIns="29149" rtlCol="0" anchor="ctr"/>
-                <a:lstStyle/>
-                <a:p>
-                  <a:pPr>
-                    <a:buFont typeface="Arial" pitchFamily="34" charset="0"/>
-                    <a:buChar char="•"/>
-                  </a:pPr>
-                  <a:r>
-                    <a:rPr lang="en-US" sz="900" b="0" baseline="0" smtClean="0">
-                      <a:solidFill>
-                        <a:schemeClr val="tx1"/>
-                      </a:solidFill>
-                    </a:rPr>
-                    <a:t>listExist</a:t>
-                  </a:r>
-                  <a:endParaRPr lang="ru-RU" sz="900" b="0" baseline="0">
-                    <a:solidFill>
-                      <a:schemeClr val="tx1"/>
-                    </a:solidFill>
-                  </a:endParaRPr>
-                </a:p>
-              </p:txBody>
-            </p:sp>
-            <p:sp>
-              <p:nvSpPr>
-                <p:cNvPr id="271" name="Прямоугольник 270"/>
-                <p:cNvSpPr/>
-                <p:nvPr/>
-              </p:nvSpPr>
-              <p:spPr>
-                <a:xfrm>
-                  <a:off x="-6491819" y="2300260"/>
-                  <a:ext cx="919592" cy="247651"/>
-                </a:xfrm>
-                <a:prstGeom prst="rect">
-                  <a:avLst/>
-                </a:prstGeom>
-              </p:spPr>
-              <p:style>
-                <a:lnRef idx="2">
-                  <a:schemeClr val="accent3">
-                    <a:shade val="50000"/>
-                  </a:schemeClr>
-                </a:lnRef>
-                <a:fillRef idx="1">
-                  <a:schemeClr val="accent3"/>
-                </a:fillRef>
-                <a:effectRef idx="0">
-                  <a:schemeClr val="accent3"/>
-                </a:effectRef>
-                <a:fontRef idx="minor">
-                  <a:schemeClr val="lt1"/>
-                </a:fontRef>
-              </p:style>
-              <p:txBody>
-                <a:bodyPr lIns="58299" tIns="29149" rIns="58299" bIns="29149" rtlCol="0" anchor="ctr"/>
-                <a:lstStyle/>
-                <a:p>
-                  <a:pPr algn="ctr"/>
-                  <a:r>
-                    <a:rPr lang="en-US" sz="1200" smtClean="0"/>
-                    <a:t>false</a:t>
-                  </a:r>
-                  <a:endParaRPr lang="ru-RU" sz="1200"/>
-                </a:p>
-              </p:txBody>
-            </p:sp>
-            <p:sp>
-              <p:nvSpPr>
-                <p:cNvPr id="272" name="Прямоугольник 271"/>
-                <p:cNvSpPr/>
-                <p:nvPr/>
-              </p:nvSpPr>
-              <p:spPr>
-                <a:xfrm>
-                  <a:off x="-5572227" y="2300259"/>
-                  <a:ext cx="1007172" cy="247651"/>
-                </a:xfrm>
-                <a:prstGeom prst="rect">
-                  <a:avLst/>
-                </a:prstGeom>
-              </p:spPr>
-              <p:style>
-                <a:lnRef idx="2">
-                  <a:schemeClr val="accent3">
-                    <a:shade val="50000"/>
-                  </a:schemeClr>
-                </a:lnRef>
-                <a:fillRef idx="1">
-                  <a:schemeClr val="accent3"/>
-                </a:fillRef>
-                <a:effectRef idx="0">
-                  <a:schemeClr val="accent3"/>
-                </a:effectRef>
-                <a:fontRef idx="minor">
-                  <a:schemeClr val="lt1"/>
-                </a:fontRef>
-              </p:style>
-              <p:txBody>
-                <a:bodyPr lIns="58299" tIns="29149" rIns="58299" bIns="29149" rtlCol="0" anchor="ctr"/>
-                <a:lstStyle/>
-                <a:p>
-                  <a:pPr algn="ctr"/>
-                  <a:r>
-                    <a:rPr lang="en-US" sz="1200" smtClean="0"/>
-                    <a:t>bool</a:t>
-                  </a:r>
-                  <a:endParaRPr lang="ru-RU" sz="1200"/>
-                </a:p>
-              </p:txBody>
-            </p:sp>
-          </p:grpSp>
-          <p:grpSp>
-            <p:nvGrpSpPr>
-              <p:cNvPr id="247" name="Группа 219"/>
-              <p:cNvGrpSpPr/>
-              <p:nvPr/>
-            </p:nvGrpSpPr>
-            <p:grpSpPr>
-              <a:xfrm>
-                <a:off x="-7572491" y="1657317"/>
-                <a:ext cx="2846357" cy="247652"/>
-                <a:chOff x="-7411412" y="2300259"/>
-                <a:chExt cx="2846357" cy="247652"/>
-              </a:xfrm>
-            </p:grpSpPr>
-            <p:sp>
-              <p:nvSpPr>
-                <p:cNvPr id="262" name="Прямоугольник 261"/>
-                <p:cNvSpPr/>
-                <p:nvPr/>
-              </p:nvSpPr>
-              <p:spPr>
-                <a:xfrm>
-                  <a:off x="-7411412" y="2300260"/>
-                  <a:ext cx="930539" cy="247651"/>
-                </a:xfrm>
-                <a:prstGeom prst="rect">
-                  <a:avLst/>
-                </a:prstGeom>
-              </p:spPr>
-              <p:style>
-                <a:lnRef idx="2">
-                  <a:schemeClr val="accent3">
-                    <a:shade val="50000"/>
-                  </a:schemeClr>
-                </a:lnRef>
-                <a:fillRef idx="1">
-                  <a:schemeClr val="accent3"/>
-                </a:fillRef>
-                <a:effectRef idx="0">
-                  <a:schemeClr val="accent3"/>
-                </a:effectRef>
-                <a:fontRef idx="minor">
-                  <a:schemeClr val="lt1"/>
-                </a:fontRef>
-              </p:style>
-              <p:txBody>
-                <a:bodyPr lIns="58299" tIns="29149" rIns="58299" bIns="29149" rtlCol="0" anchor="ctr"/>
-                <a:lstStyle/>
-                <a:p>
-                  <a:pPr>
-                    <a:buFont typeface="Arial" pitchFamily="34" charset="0"/>
-                    <a:buChar char="•"/>
-                  </a:pPr>
-                  <a:r>
-                    <a:rPr lang="en-US" sz="900" smtClean="0">
-                      <a:solidFill>
-                        <a:schemeClr val="tx1"/>
-                      </a:solidFill>
-                    </a:rPr>
-                    <a:t>idList</a:t>
-                  </a:r>
-                  <a:endParaRPr lang="ru-RU" sz="900" b="0" baseline="0">
-                    <a:solidFill>
-                      <a:schemeClr val="tx1"/>
-                    </a:solidFill>
-                  </a:endParaRPr>
-                </a:p>
-              </p:txBody>
-            </p:sp>
-            <p:sp>
-              <p:nvSpPr>
-                <p:cNvPr id="267" name="Прямоугольник 266"/>
-                <p:cNvSpPr/>
-                <p:nvPr/>
-              </p:nvSpPr>
-              <p:spPr>
-                <a:xfrm>
-                  <a:off x="-6491819" y="2300260"/>
-                  <a:ext cx="919592" cy="247651"/>
-                </a:xfrm>
-                <a:prstGeom prst="rect">
-                  <a:avLst/>
-                </a:prstGeom>
-              </p:spPr>
-              <p:style>
-                <a:lnRef idx="2">
-                  <a:schemeClr val="accent3">
-                    <a:shade val="50000"/>
-                  </a:schemeClr>
-                </a:lnRef>
-                <a:fillRef idx="1">
-                  <a:schemeClr val="accent3"/>
-                </a:fillRef>
-                <a:effectRef idx="0">
-                  <a:schemeClr val="accent3"/>
-                </a:effectRef>
-                <a:fontRef idx="minor">
-                  <a:schemeClr val="lt1"/>
-                </a:fontRef>
-              </p:style>
-              <p:txBody>
-                <a:bodyPr lIns="58299" tIns="29149" rIns="58299" bIns="29149" rtlCol="0" anchor="ctr"/>
-                <a:lstStyle/>
-                <a:p>
-                  <a:pPr algn="ctr"/>
-                  <a:r>
-                    <a:rPr lang="en-US" sz="1200" smtClean="0"/>
-                    <a:t>“”</a:t>
-                  </a:r>
-                  <a:endParaRPr lang="ru-RU" sz="1200"/>
-                </a:p>
-              </p:txBody>
-            </p:sp>
-            <p:sp>
-              <p:nvSpPr>
-                <p:cNvPr id="268" name="Прямоугольник 267"/>
-                <p:cNvSpPr/>
-                <p:nvPr/>
-              </p:nvSpPr>
-              <p:spPr>
-                <a:xfrm>
-                  <a:off x="-5572227" y="2300259"/>
-                  <a:ext cx="1007172" cy="247651"/>
-                </a:xfrm>
-                <a:prstGeom prst="rect">
-                  <a:avLst/>
-                </a:prstGeom>
-              </p:spPr>
-              <p:style>
-                <a:lnRef idx="2">
-                  <a:schemeClr val="accent3">
-                    <a:shade val="50000"/>
-                  </a:schemeClr>
-                </a:lnRef>
-                <a:fillRef idx="1">
-                  <a:schemeClr val="accent3"/>
-                </a:fillRef>
-                <a:effectRef idx="0">
-                  <a:schemeClr val="accent3"/>
-                </a:effectRef>
-                <a:fontRef idx="minor">
-                  <a:schemeClr val="lt1"/>
-                </a:fontRef>
-              </p:style>
-              <p:txBody>
-                <a:bodyPr lIns="58299" tIns="29149" rIns="58299" bIns="29149" rtlCol="0" anchor="ctr"/>
-                <a:lstStyle/>
-                <a:p>
-                  <a:pPr algn="ctr"/>
-                  <a:r>
-                    <a:rPr lang="en-US" sz="1200" smtClean="0"/>
-                    <a:t>str</a:t>
-                  </a:r>
-                  <a:endParaRPr lang="ru-RU" sz="1200"/>
-                </a:p>
-              </p:txBody>
-            </p:sp>
-          </p:grpSp>
-          <p:grpSp>
-            <p:nvGrpSpPr>
               <p:cNvPr id="248" name="Группа 224"/>
               <p:cNvGrpSpPr/>
               <p:nvPr/>
@@ -11962,54 +11646,12 @@
       <p:cxnSp>
         <p:nvCxnSpPr>
           <p:cNvPr id="303" name="Прямая со стрелкой 302"/>
-          <p:cNvCxnSpPr>
-            <a:stCxn id="196" idx="3"/>
-            <a:endCxn id="269" idx="1"/>
-          </p:cNvCxnSpPr>
+          <p:cNvCxnSpPr/>
           <p:nvPr/>
         </p:nvCxnSpPr>
         <p:spPr>
           <a:xfrm>
             <a:off x="-4511820" y="4924415"/>
-            <a:ext cx="654105" cy="71439"/>
-          </a:xfrm>
-          <a:prstGeom prst="straightConnector1">
-            <a:avLst/>
-          </a:prstGeom>
-          <a:ln>
-            <a:solidFill>
-              <a:srgbClr val="FFC000"/>
-            </a:solidFill>
-            <a:tailEnd type="arrow"/>
-          </a:ln>
-        </p:spPr>
-        <p:style>
-          <a:lnRef idx="1">
-            <a:schemeClr val="accent1"/>
-          </a:lnRef>
-          <a:fillRef idx="0">
-            <a:schemeClr val="accent1"/>
-          </a:fillRef>
-          <a:effectRef idx="0">
-            <a:schemeClr val="accent1"/>
-          </a:effectRef>
-          <a:fontRef idx="minor">
-            <a:schemeClr val="tx1"/>
-          </a:fontRef>
-        </p:style>
-      </p:cxnSp>
-      <p:cxnSp>
-        <p:nvCxnSpPr>
-          <p:cNvPr id="309" name="Прямая со стрелкой 308"/>
-          <p:cNvCxnSpPr>
-            <a:stCxn id="224" idx="3"/>
-            <a:endCxn id="262" idx="1"/>
-          </p:cNvCxnSpPr>
-          <p:nvPr/>
-        </p:nvCxnSpPr>
-        <p:spPr>
-          <a:xfrm>
-            <a:off x="-4511820" y="5138729"/>
             <a:ext cx="654105" cy="71439"/>
           </a:xfrm>
           <a:prstGeom prst="straightConnector1">
@@ -19642,322 +19284,6 @@
                       <a:t>App</a:t>
                     </a:r>
                     <a:endParaRPr lang="ru-RU" sz="1400" b="1"/>
-                  </a:p>
-                </p:txBody>
-              </p:sp>
-            </p:grpSp>
-            <p:grpSp>
-              <p:nvGrpSpPr>
-                <p:cNvPr id="218" name="Группа 217"/>
-                <p:cNvGrpSpPr/>
-                <p:nvPr/>
-              </p:nvGrpSpPr>
-              <p:grpSpPr>
-                <a:xfrm>
-                  <a:off x="-7572491" y="1443003"/>
-                  <a:ext cx="2846357" cy="247652"/>
-                  <a:chOff x="-7411412" y="2300259"/>
-                  <a:chExt cx="2846357" cy="247652"/>
-                </a:xfrm>
-              </p:grpSpPr>
-              <p:sp>
-                <p:nvSpPr>
-                  <p:cNvPr id="194" name="Прямоугольник 193"/>
-                  <p:cNvSpPr/>
-                  <p:nvPr/>
-                </p:nvSpPr>
-                <p:spPr>
-                  <a:xfrm>
-                    <a:off x="-7411412" y="2300260"/>
-                    <a:ext cx="930539" cy="247651"/>
-                  </a:xfrm>
-                  <a:prstGeom prst="rect">
-                    <a:avLst/>
-                  </a:prstGeom>
-                </p:spPr>
-                <p:style>
-                  <a:lnRef idx="2">
-                    <a:schemeClr val="accent3">
-                      <a:shade val="50000"/>
-                    </a:schemeClr>
-                  </a:lnRef>
-                  <a:fillRef idx="1">
-                    <a:schemeClr val="accent3"/>
-                  </a:fillRef>
-                  <a:effectRef idx="0">
-                    <a:schemeClr val="accent3"/>
-                  </a:effectRef>
-                  <a:fontRef idx="minor">
-                    <a:schemeClr val="lt1"/>
-                  </a:fontRef>
-                </p:style>
-                <p:txBody>
-                  <a:bodyPr lIns="58299" tIns="29149" rIns="58299" bIns="29149" rtlCol="0" anchor="ctr"/>
-                  <a:lstStyle/>
-                  <a:p>
-                    <a:pPr>
-                      <a:buFont typeface="Arial" pitchFamily="34" charset="0"/>
-                      <a:buChar char="•"/>
-                    </a:pPr>
-                    <a:r>
-                      <a:rPr lang="en-US" sz="900" b="0" baseline="0" smtClean="0">
-                        <a:solidFill>
-                          <a:schemeClr val="tx1"/>
-                        </a:solidFill>
-                      </a:rPr>
-                      <a:t>listExist</a:t>
-                    </a:r>
-                    <a:endParaRPr lang="ru-RU" sz="900" b="0" baseline="0">
-                      <a:solidFill>
-                        <a:schemeClr val="tx1"/>
-                      </a:solidFill>
-                    </a:endParaRPr>
-                  </a:p>
-                </p:txBody>
-              </p:sp>
-              <p:sp>
-                <p:nvSpPr>
-                  <p:cNvPr id="195" name="Прямоугольник 194"/>
-                  <p:cNvSpPr/>
-                  <p:nvPr/>
-                </p:nvSpPr>
-                <p:spPr>
-                  <a:xfrm>
-                    <a:off x="-6491819" y="2300260"/>
-                    <a:ext cx="919592" cy="247651"/>
-                  </a:xfrm>
-                  <a:prstGeom prst="rect">
-                    <a:avLst/>
-                  </a:prstGeom>
-                </p:spPr>
-                <p:style>
-                  <a:lnRef idx="2">
-                    <a:schemeClr val="accent3">
-                      <a:shade val="50000"/>
-                    </a:schemeClr>
-                  </a:lnRef>
-                  <a:fillRef idx="1">
-                    <a:schemeClr val="accent3"/>
-                  </a:fillRef>
-                  <a:effectRef idx="0">
-                    <a:schemeClr val="accent3"/>
-                  </a:effectRef>
-                  <a:fontRef idx="minor">
-                    <a:schemeClr val="lt1"/>
-                  </a:fontRef>
-                </p:style>
-                <p:txBody>
-                  <a:bodyPr lIns="58299" tIns="29149" rIns="58299" bIns="29149" rtlCol="0" anchor="ctr"/>
-                  <a:lstStyle/>
-                  <a:p>
-                    <a:pPr algn="ctr"/>
-                    <a:r>
-                      <a:rPr lang="en-US" sz="1200" smtClean="0"/>
-                      <a:t>false</a:t>
-                    </a:r>
-                    <a:endParaRPr lang="ru-RU" sz="1200"/>
-                  </a:p>
-                </p:txBody>
-              </p:sp>
-              <p:sp>
-                <p:nvSpPr>
-                  <p:cNvPr id="196" name="Прямоугольник 195"/>
-                  <p:cNvSpPr/>
-                  <p:nvPr/>
-                </p:nvSpPr>
-                <p:spPr>
-                  <a:xfrm>
-                    <a:off x="-5572227" y="2300259"/>
-                    <a:ext cx="1007172" cy="247651"/>
-                  </a:xfrm>
-                  <a:prstGeom prst="rect">
-                    <a:avLst/>
-                  </a:prstGeom>
-                </p:spPr>
-                <p:style>
-                  <a:lnRef idx="2">
-                    <a:schemeClr val="accent3">
-                      <a:shade val="50000"/>
-                    </a:schemeClr>
-                  </a:lnRef>
-                  <a:fillRef idx="1">
-                    <a:schemeClr val="accent3"/>
-                  </a:fillRef>
-                  <a:effectRef idx="0">
-                    <a:schemeClr val="accent3"/>
-                  </a:effectRef>
-                  <a:fontRef idx="minor">
-                    <a:schemeClr val="lt1"/>
-                  </a:fontRef>
-                </p:style>
-                <p:txBody>
-                  <a:bodyPr lIns="58299" tIns="29149" rIns="58299" bIns="29149" rtlCol="0" anchor="ctr"/>
-                  <a:lstStyle/>
-                  <a:p>
-                    <a:pPr algn="ctr"/>
-                    <a:r>
-                      <a:rPr lang="en-US" sz="1200" smtClean="0"/>
-                      <a:t>bool</a:t>
-                    </a:r>
-                    <a:endParaRPr lang="ru-RU" sz="1200"/>
-                  </a:p>
-                </p:txBody>
-              </p:sp>
-            </p:grpSp>
-            <p:grpSp>
-              <p:nvGrpSpPr>
-                <p:cNvPr id="220" name="Группа 219"/>
-                <p:cNvGrpSpPr/>
-                <p:nvPr/>
-              </p:nvGrpSpPr>
-              <p:grpSpPr>
-                <a:xfrm>
-                  <a:off x="-7572491" y="1657317"/>
-                  <a:ext cx="2846357" cy="247652"/>
-                  <a:chOff x="-7411412" y="2300259"/>
-                  <a:chExt cx="2846357" cy="247652"/>
-                </a:xfrm>
-              </p:grpSpPr>
-              <p:sp>
-                <p:nvSpPr>
-                  <p:cNvPr id="221" name="Прямоугольник 220"/>
-                  <p:cNvSpPr/>
-                  <p:nvPr/>
-                </p:nvSpPr>
-                <p:spPr>
-                  <a:xfrm>
-                    <a:off x="-7411412" y="2300260"/>
-                    <a:ext cx="930539" cy="247651"/>
-                  </a:xfrm>
-                  <a:prstGeom prst="rect">
-                    <a:avLst/>
-                  </a:prstGeom>
-                </p:spPr>
-                <p:style>
-                  <a:lnRef idx="2">
-                    <a:schemeClr val="accent3">
-                      <a:shade val="50000"/>
-                    </a:schemeClr>
-                  </a:lnRef>
-                  <a:fillRef idx="1">
-                    <a:schemeClr val="accent3"/>
-                  </a:fillRef>
-                  <a:effectRef idx="0">
-                    <a:schemeClr val="accent3"/>
-                  </a:effectRef>
-                  <a:fontRef idx="minor">
-                    <a:schemeClr val="lt1"/>
-                  </a:fontRef>
-                </p:style>
-                <p:txBody>
-                  <a:bodyPr lIns="58299" tIns="29149" rIns="58299" bIns="29149" rtlCol="0" anchor="ctr"/>
-                  <a:lstStyle/>
-                  <a:p>
-                    <a:pPr>
-                      <a:buFont typeface="Arial" pitchFamily="34" charset="0"/>
-                      <a:buChar char="•"/>
-                    </a:pPr>
-                    <a:r>
-                      <a:rPr lang="en-US" sz="900" smtClean="0">
-                        <a:solidFill>
-                          <a:schemeClr val="tx1"/>
-                        </a:solidFill>
-                      </a:rPr>
-                      <a:t>idList</a:t>
-                    </a:r>
-                    <a:endParaRPr lang="ru-RU" sz="900" b="0" baseline="0">
-                      <a:solidFill>
-                        <a:schemeClr val="tx1"/>
-                      </a:solidFill>
-                    </a:endParaRPr>
-                  </a:p>
-                </p:txBody>
-              </p:sp>
-              <p:sp>
-                <p:nvSpPr>
-                  <p:cNvPr id="223" name="Прямоугольник 222"/>
-                  <p:cNvSpPr/>
-                  <p:nvPr/>
-                </p:nvSpPr>
-                <p:spPr>
-                  <a:xfrm>
-                    <a:off x="-6491819" y="2300260"/>
-                    <a:ext cx="919592" cy="247651"/>
-                  </a:xfrm>
-                  <a:prstGeom prst="rect">
-                    <a:avLst/>
-                  </a:prstGeom>
-                </p:spPr>
-                <p:style>
-                  <a:lnRef idx="2">
-                    <a:schemeClr val="accent3">
-                      <a:shade val="50000"/>
-                    </a:schemeClr>
-                  </a:lnRef>
-                  <a:fillRef idx="1">
-                    <a:schemeClr val="accent3"/>
-                  </a:fillRef>
-                  <a:effectRef idx="0">
-                    <a:schemeClr val="accent3"/>
-                  </a:effectRef>
-                  <a:fontRef idx="minor">
-                    <a:schemeClr val="lt1"/>
-                  </a:fontRef>
-                </p:style>
-                <p:txBody>
-                  <a:bodyPr lIns="58299" tIns="29149" rIns="58299" bIns="29149" rtlCol="0" anchor="ctr"/>
-                  <a:lstStyle/>
-                  <a:p>
-                    <a:pPr algn="ctr"/>
-                    <a:r>
-                      <a:rPr lang="en-US" sz="1200" smtClean="0"/>
-                      <a:t>“”</a:t>
-                    </a:r>
-                    <a:endParaRPr lang="ru-RU" sz="1200"/>
-                  </a:p>
-                </p:txBody>
-              </p:sp>
-              <p:sp>
-                <p:nvSpPr>
-                  <p:cNvPr id="224" name="Прямоугольник 223"/>
-                  <p:cNvSpPr/>
-                  <p:nvPr/>
-                </p:nvSpPr>
-                <p:spPr>
-                  <a:xfrm>
-                    <a:off x="-5572227" y="2300259"/>
-                    <a:ext cx="1007172" cy="247651"/>
-                  </a:xfrm>
-                  <a:prstGeom prst="rect">
-                    <a:avLst/>
-                  </a:prstGeom>
-                </p:spPr>
-                <p:style>
-                  <a:lnRef idx="2">
-                    <a:schemeClr val="accent3">
-                      <a:shade val="50000"/>
-                    </a:schemeClr>
-                  </a:lnRef>
-                  <a:fillRef idx="1">
-                    <a:schemeClr val="accent3"/>
-                  </a:fillRef>
-                  <a:effectRef idx="0">
-                    <a:schemeClr val="accent3"/>
-                  </a:effectRef>
-                  <a:fontRef idx="minor">
-                    <a:schemeClr val="lt1"/>
-                  </a:fontRef>
-                </p:style>
-                <p:txBody>
-                  <a:bodyPr lIns="58299" tIns="29149" rIns="58299" bIns="29149" rtlCol="0" anchor="ctr"/>
-                  <a:lstStyle/>
-                  <a:p>
-                    <a:pPr algn="ctr"/>
-                    <a:r>
-                      <a:rPr lang="en-US" sz="1200" smtClean="0"/>
-                      <a:t>str</a:t>
-                    </a:r>
-                    <a:endParaRPr lang="ru-RU" sz="1200"/>
                   </a:p>
                 </p:txBody>
               </p:sp>

</xml_diff>

<commit_message>
add handler quiz id
</commit_message>
<xml_diff>
--- a/report/structure.pptx
+++ b/report/structure.pptx
@@ -19890,7 +19890,7 @@
                   <a:schemeClr val="tx1"/>
                 </a:solidFill>
               </a:rPr>
-              <a:t>getAll Category</a:t>
+              <a:t>getMenuNodes</a:t>
             </a:r>
             <a:r>
               <a:rPr lang="en-US" sz="900" b="0" baseline="0" smtClean="0">
@@ -20007,7 +20007,15 @@
                     <a:schemeClr val="tx1"/>
                   </a:solidFill>
                 </a:rPr>
-                <a:t>dataCategory</a:t>
+                <a:t>data</a:t>
+              </a:r>
+              <a:r>
+                <a:rPr lang="en-US" sz="900" smtClean="0">
+                  <a:solidFill>
+                    <a:schemeClr val="tx1"/>
+                  </a:solidFill>
+                </a:rPr>
+                <a:t>MenuNodes</a:t>
               </a:r>
               <a:endParaRPr lang="ru-RU" sz="900" b="0" baseline="0">
                 <a:solidFill>
@@ -20206,7 +20214,7 @@
                     <a:schemeClr val="tx1"/>
                   </a:solidFill>
                 </a:rPr>
-                <a:t>dataCategory</a:t>
+                <a:t>dataMenuNodes</a:t>
               </a:r>
               <a:endParaRPr lang="ru-RU" sz="900" b="0" baseline="0">
                 <a:solidFill>
@@ -21126,7 +21134,7 @@
                       <a:schemeClr val="tx1"/>
                     </a:solidFill>
                   </a:rPr>
-                  <a:t>dataCategory</a:t>
+                  <a:t>dataMenuNodes</a:t>
                 </a:r>
                 <a:endParaRPr lang="ru-RU" sz="900" b="0" baseline="0">
                   <a:solidFill>
@@ -21844,6 +21852,1272 @@
           </p:txBody>
         </p:sp>
       </p:grpSp>
+      <p:sp>
+        <p:nvSpPr>
+          <p:cNvPr id="344" name="Прямоугольник 343"/>
+          <p:cNvSpPr/>
+          <p:nvPr/>
+        </p:nvSpPr>
+        <p:spPr>
+          <a:xfrm>
+            <a:off x="965473" y="11087133"/>
+            <a:ext cx="2393349" cy="293079"/>
+          </a:xfrm>
+          <a:prstGeom prst="rect">
+            <a:avLst/>
+          </a:prstGeom>
+        </p:spPr>
+        <p:style>
+          <a:lnRef idx="2">
+            <a:schemeClr val="accent6">
+              <a:shade val="50000"/>
+            </a:schemeClr>
+          </a:lnRef>
+          <a:fillRef idx="1">
+            <a:schemeClr val="accent6"/>
+          </a:fillRef>
+          <a:effectRef idx="0">
+            <a:schemeClr val="accent6"/>
+          </a:effectRef>
+          <a:fontRef idx="minor">
+            <a:schemeClr val="lt1"/>
+          </a:fontRef>
+        </p:style>
+        <p:txBody>
+          <a:bodyPr lIns="58299" tIns="29149" rIns="58299" bIns="29149" rtlCol="0" anchor="ctr"/>
+          <a:lstStyle/>
+          <a:p>
+            <a:pPr>
+              <a:buFont typeface="Arial" pitchFamily="34" charset="0"/>
+              <a:buNone/>
+            </a:pPr>
+            <a:r>
+              <a:rPr lang="en-US" sz="900" b="0" baseline="0" smtClean="0">
+                <a:solidFill>
+                  <a:schemeClr val="tx1"/>
+                </a:solidFill>
+              </a:rPr>
+              <a:t>map</a:t>
+            </a:r>
+            <a:endParaRPr lang="ru-RU" sz="900" b="0" baseline="0">
+              <a:solidFill>
+                <a:schemeClr val="tx1"/>
+              </a:solidFill>
+            </a:endParaRPr>
+          </a:p>
+        </p:txBody>
+      </p:sp>
+      <p:sp>
+        <p:nvSpPr>
+          <p:cNvPr id="345" name="Прямоугольник 344"/>
+          <p:cNvSpPr/>
+          <p:nvPr/>
+        </p:nvSpPr>
+        <p:spPr>
+          <a:xfrm>
+            <a:off x="2714581" y="11087133"/>
+            <a:ext cx="1214446" cy="293079"/>
+          </a:xfrm>
+          <a:prstGeom prst="rect">
+            <a:avLst/>
+          </a:prstGeom>
+        </p:spPr>
+        <p:style>
+          <a:lnRef idx="2">
+            <a:schemeClr val="accent6">
+              <a:shade val="50000"/>
+            </a:schemeClr>
+          </a:lnRef>
+          <a:fillRef idx="1">
+            <a:schemeClr val="accent6"/>
+          </a:fillRef>
+          <a:effectRef idx="0">
+            <a:schemeClr val="accent6"/>
+          </a:effectRef>
+          <a:fontRef idx="minor">
+            <a:schemeClr val="lt1"/>
+          </a:fontRef>
+        </p:style>
+        <p:txBody>
+          <a:bodyPr lIns="58299" tIns="29149" rIns="58299" bIns="29149" rtlCol="0" anchor="ctr"/>
+          <a:lstStyle/>
+          <a:p>
+            <a:pPr algn="ctr"/>
+            <a:endParaRPr lang="ru-RU" sz="900"/>
+          </a:p>
+        </p:txBody>
+      </p:sp>
+      <p:cxnSp>
+        <p:nvCxnSpPr>
+          <p:cNvPr id="377" name="Соединительная линия уступом 376"/>
+          <p:cNvCxnSpPr>
+            <a:stCxn id="427" idx="1"/>
+            <a:endCxn id="344" idx="1"/>
+          </p:cNvCxnSpPr>
+          <p:nvPr/>
+        </p:nvCxnSpPr>
+        <p:spPr>
+          <a:xfrm rot="10800000" flipV="1">
+            <a:off x="965473" y="10391803"/>
+            <a:ext cx="34596" cy="841869"/>
+          </a:xfrm>
+          <a:prstGeom prst="bentConnector3">
+            <a:avLst>
+              <a:gd name="adj1" fmla="val 760770"/>
+            </a:avLst>
+          </a:prstGeom>
+          <a:ln>
+            <a:tailEnd type="arrow"/>
+          </a:ln>
+        </p:spPr>
+        <p:style>
+          <a:lnRef idx="1">
+            <a:schemeClr val="accent1"/>
+          </a:lnRef>
+          <a:fillRef idx="0">
+            <a:schemeClr val="accent1"/>
+          </a:fillRef>
+          <a:effectRef idx="0">
+            <a:schemeClr val="accent1"/>
+          </a:effectRef>
+          <a:fontRef idx="minor">
+            <a:schemeClr val="tx1"/>
+          </a:fontRef>
+        </p:style>
+      </p:cxnSp>
+      <p:sp>
+        <p:nvSpPr>
+          <p:cNvPr id="383" name="Прямоугольник 382"/>
+          <p:cNvSpPr/>
+          <p:nvPr/>
+        </p:nvSpPr>
+        <p:spPr>
+          <a:xfrm>
+            <a:off x="-7349076" y="4800589"/>
+            <a:ext cx="930539" cy="247651"/>
+          </a:xfrm>
+          <a:prstGeom prst="rect">
+            <a:avLst/>
+          </a:prstGeom>
+        </p:spPr>
+        <p:style>
+          <a:lnRef idx="2">
+            <a:schemeClr val="accent3">
+              <a:shade val="50000"/>
+            </a:schemeClr>
+          </a:lnRef>
+          <a:fillRef idx="1">
+            <a:schemeClr val="accent3"/>
+          </a:fillRef>
+          <a:effectRef idx="0">
+            <a:schemeClr val="accent3"/>
+          </a:effectRef>
+          <a:fontRef idx="minor">
+            <a:schemeClr val="lt1"/>
+          </a:fontRef>
+        </p:style>
+        <p:txBody>
+          <a:bodyPr lIns="58299" tIns="29149" rIns="58299" bIns="29149" rtlCol="0" anchor="ctr"/>
+          <a:lstStyle/>
+          <a:p>
+            <a:pPr>
+              <a:buFont typeface="Arial" pitchFamily="34" charset="0"/>
+              <a:buChar char="•"/>
+            </a:pPr>
+            <a:r>
+              <a:rPr lang="en-US" sz="900" b="0" baseline="0" smtClean="0">
+                <a:solidFill>
+                  <a:schemeClr val="tx1"/>
+                </a:solidFill>
+              </a:rPr>
+              <a:t>quizId</a:t>
+            </a:r>
+            <a:endParaRPr lang="ru-RU" sz="900" b="0" baseline="0">
+              <a:solidFill>
+                <a:schemeClr val="tx1"/>
+              </a:solidFill>
+            </a:endParaRPr>
+          </a:p>
+        </p:txBody>
+      </p:sp>
+      <p:sp>
+        <p:nvSpPr>
+          <p:cNvPr id="384" name="Прямоугольник 383"/>
+          <p:cNvSpPr/>
+          <p:nvPr/>
+        </p:nvSpPr>
+        <p:spPr>
+          <a:xfrm>
+            <a:off x="-6429483" y="4800589"/>
+            <a:ext cx="919592" cy="247651"/>
+          </a:xfrm>
+          <a:prstGeom prst="rect">
+            <a:avLst/>
+          </a:prstGeom>
+        </p:spPr>
+        <p:style>
+          <a:lnRef idx="2">
+            <a:schemeClr val="accent3">
+              <a:shade val="50000"/>
+            </a:schemeClr>
+          </a:lnRef>
+          <a:fillRef idx="1">
+            <a:schemeClr val="accent3"/>
+          </a:fillRef>
+          <a:effectRef idx="0">
+            <a:schemeClr val="accent3"/>
+          </a:effectRef>
+          <a:fontRef idx="minor">
+            <a:schemeClr val="lt1"/>
+          </a:fontRef>
+        </p:style>
+        <p:txBody>
+          <a:bodyPr lIns="58299" tIns="29149" rIns="58299" bIns="29149" rtlCol="0" anchor="ctr"/>
+          <a:lstStyle/>
+          <a:p>
+            <a:pPr algn="ctr"/>
+            <a:r>
+              <a:rPr lang="en-US" sz="1200" smtClean="0"/>
+              <a:t>“”</a:t>
+            </a:r>
+            <a:endParaRPr lang="ru-RU" sz="1200"/>
+          </a:p>
+        </p:txBody>
+      </p:sp>
+      <p:sp>
+        <p:nvSpPr>
+          <p:cNvPr id="391" name="Прямоугольник 390"/>
+          <p:cNvSpPr/>
+          <p:nvPr/>
+        </p:nvSpPr>
+        <p:spPr>
+          <a:xfrm>
+            <a:off x="-5509891" y="4800588"/>
+            <a:ext cx="1007172" cy="247651"/>
+          </a:xfrm>
+          <a:prstGeom prst="rect">
+            <a:avLst/>
+          </a:prstGeom>
+        </p:spPr>
+        <p:style>
+          <a:lnRef idx="2">
+            <a:schemeClr val="accent3">
+              <a:shade val="50000"/>
+            </a:schemeClr>
+          </a:lnRef>
+          <a:fillRef idx="1">
+            <a:schemeClr val="accent3"/>
+          </a:fillRef>
+          <a:effectRef idx="0">
+            <a:schemeClr val="accent3"/>
+          </a:effectRef>
+          <a:fontRef idx="minor">
+            <a:schemeClr val="lt1"/>
+          </a:fontRef>
+        </p:style>
+        <p:txBody>
+          <a:bodyPr lIns="58299" tIns="29149" rIns="58299" bIns="29149" rtlCol="0" anchor="ctr"/>
+          <a:lstStyle/>
+          <a:p>
+            <a:pPr algn="ctr"/>
+            <a:r>
+              <a:rPr lang="en-US" sz="1200" smtClean="0"/>
+              <a:t>str</a:t>
+            </a:r>
+            <a:endParaRPr lang="ru-RU" sz="1200"/>
+          </a:p>
+        </p:txBody>
+      </p:sp>
+      <p:sp>
+        <p:nvSpPr>
+          <p:cNvPr id="393" name="Прямоугольник 392"/>
+          <p:cNvSpPr/>
+          <p:nvPr/>
+        </p:nvSpPr>
+        <p:spPr>
+          <a:xfrm>
+            <a:off x="-3857715" y="4872027"/>
+            <a:ext cx="930539" cy="247651"/>
+          </a:xfrm>
+          <a:prstGeom prst="rect">
+            <a:avLst/>
+          </a:prstGeom>
+        </p:spPr>
+        <p:style>
+          <a:lnRef idx="2">
+            <a:schemeClr val="accent3">
+              <a:shade val="50000"/>
+            </a:schemeClr>
+          </a:lnRef>
+          <a:fillRef idx="1">
+            <a:schemeClr val="accent3"/>
+          </a:fillRef>
+          <a:effectRef idx="0">
+            <a:schemeClr val="accent3"/>
+          </a:effectRef>
+          <a:fontRef idx="minor">
+            <a:schemeClr val="lt1"/>
+          </a:fontRef>
+        </p:style>
+        <p:txBody>
+          <a:bodyPr lIns="58299" tIns="29149" rIns="58299" bIns="29149" rtlCol="0" anchor="ctr"/>
+          <a:lstStyle/>
+          <a:p>
+            <a:pPr>
+              <a:buFont typeface="Arial" pitchFamily="34" charset="0"/>
+              <a:buChar char="•"/>
+            </a:pPr>
+            <a:r>
+              <a:rPr lang="en-US" sz="900" b="0" baseline="0" smtClean="0">
+                <a:solidFill>
+                  <a:schemeClr val="tx1"/>
+                </a:solidFill>
+              </a:rPr>
+              <a:t>quizId</a:t>
+            </a:r>
+            <a:endParaRPr lang="ru-RU" sz="900" b="0" baseline="0">
+              <a:solidFill>
+                <a:schemeClr val="tx1"/>
+              </a:solidFill>
+            </a:endParaRPr>
+          </a:p>
+        </p:txBody>
+      </p:sp>
+      <p:sp>
+        <p:nvSpPr>
+          <p:cNvPr id="395" name="Прямоугольник 394"/>
+          <p:cNvSpPr/>
+          <p:nvPr/>
+        </p:nvSpPr>
+        <p:spPr>
+          <a:xfrm>
+            <a:off x="-2938122" y="4872027"/>
+            <a:ext cx="919592" cy="247651"/>
+          </a:xfrm>
+          <a:prstGeom prst="rect">
+            <a:avLst/>
+          </a:prstGeom>
+        </p:spPr>
+        <p:style>
+          <a:lnRef idx="2">
+            <a:schemeClr val="accent3">
+              <a:shade val="50000"/>
+            </a:schemeClr>
+          </a:lnRef>
+          <a:fillRef idx="1">
+            <a:schemeClr val="accent3"/>
+          </a:fillRef>
+          <a:effectRef idx="0">
+            <a:schemeClr val="accent3"/>
+          </a:effectRef>
+          <a:fontRef idx="minor">
+            <a:schemeClr val="lt1"/>
+          </a:fontRef>
+        </p:style>
+        <p:txBody>
+          <a:bodyPr lIns="58299" tIns="29149" rIns="58299" bIns="29149" rtlCol="0" anchor="ctr"/>
+          <a:lstStyle/>
+          <a:p>
+            <a:pPr algn="ctr"/>
+            <a:r>
+              <a:rPr lang="en-US" sz="1200" smtClean="0"/>
+              <a:t>“”</a:t>
+            </a:r>
+            <a:endParaRPr lang="ru-RU" sz="1200"/>
+          </a:p>
+        </p:txBody>
+      </p:sp>
+      <p:sp>
+        <p:nvSpPr>
+          <p:cNvPr id="396" name="Прямоугольник 395"/>
+          <p:cNvSpPr/>
+          <p:nvPr/>
+        </p:nvSpPr>
+        <p:spPr>
+          <a:xfrm>
+            <a:off x="-2018530" y="4872026"/>
+            <a:ext cx="1007172" cy="247651"/>
+          </a:xfrm>
+          <a:prstGeom prst="rect">
+            <a:avLst/>
+          </a:prstGeom>
+        </p:spPr>
+        <p:style>
+          <a:lnRef idx="2">
+            <a:schemeClr val="accent3">
+              <a:shade val="50000"/>
+            </a:schemeClr>
+          </a:lnRef>
+          <a:fillRef idx="1">
+            <a:schemeClr val="accent3"/>
+          </a:fillRef>
+          <a:effectRef idx="0">
+            <a:schemeClr val="accent3"/>
+          </a:effectRef>
+          <a:fontRef idx="minor">
+            <a:schemeClr val="lt1"/>
+          </a:fontRef>
+        </p:style>
+        <p:txBody>
+          <a:bodyPr lIns="58299" tIns="29149" rIns="58299" bIns="29149" rtlCol="0" anchor="ctr"/>
+          <a:lstStyle/>
+          <a:p>
+            <a:pPr algn="ctr"/>
+            <a:r>
+              <a:rPr lang="en-US" sz="1200" smtClean="0"/>
+              <a:t>str</a:t>
+            </a:r>
+            <a:endParaRPr lang="ru-RU" sz="1200"/>
+          </a:p>
+        </p:txBody>
+      </p:sp>
+      <p:sp>
+        <p:nvSpPr>
+          <p:cNvPr id="397" name="Прямоугольник 396"/>
+          <p:cNvSpPr/>
+          <p:nvPr/>
+        </p:nvSpPr>
+        <p:spPr>
+          <a:xfrm>
+            <a:off x="4537373" y="10587067"/>
+            <a:ext cx="2393349" cy="293079"/>
+          </a:xfrm>
+          <a:prstGeom prst="rect">
+            <a:avLst/>
+          </a:prstGeom>
+        </p:spPr>
+        <p:style>
+          <a:lnRef idx="2">
+            <a:schemeClr val="accent6">
+              <a:shade val="50000"/>
+            </a:schemeClr>
+          </a:lnRef>
+          <a:fillRef idx="1">
+            <a:schemeClr val="accent6"/>
+          </a:fillRef>
+          <a:effectRef idx="0">
+            <a:schemeClr val="accent6"/>
+          </a:effectRef>
+          <a:fontRef idx="minor">
+            <a:schemeClr val="lt1"/>
+          </a:fontRef>
+        </p:style>
+        <p:txBody>
+          <a:bodyPr lIns="58299" tIns="29149" rIns="58299" bIns="29149" rtlCol="0" anchor="ctr"/>
+          <a:lstStyle/>
+          <a:p>
+            <a:pPr>
+              <a:buFont typeface="Arial" pitchFamily="34" charset="0"/>
+              <a:buNone/>
+            </a:pPr>
+            <a:r>
+              <a:rPr lang="en-US" sz="900" smtClean="0">
+                <a:solidFill>
+                  <a:schemeClr val="tx1"/>
+                </a:solidFill>
+              </a:rPr>
+              <a:t>handleClick(e)</a:t>
+            </a:r>
+            <a:endParaRPr lang="ru-RU" sz="900" b="0" baseline="0">
+              <a:solidFill>
+                <a:schemeClr val="tx1"/>
+              </a:solidFill>
+            </a:endParaRPr>
+          </a:p>
+        </p:txBody>
+      </p:sp>
+      <p:sp>
+        <p:nvSpPr>
+          <p:cNvPr id="398" name="Прямоугольник 397"/>
+          <p:cNvSpPr/>
+          <p:nvPr/>
+        </p:nvSpPr>
+        <p:spPr>
+          <a:xfrm>
+            <a:off x="6286481" y="10587067"/>
+            <a:ext cx="1214446" cy="293079"/>
+          </a:xfrm>
+          <a:prstGeom prst="rect">
+            <a:avLst/>
+          </a:prstGeom>
+        </p:spPr>
+        <p:style>
+          <a:lnRef idx="2">
+            <a:schemeClr val="accent6">
+              <a:shade val="50000"/>
+            </a:schemeClr>
+          </a:lnRef>
+          <a:fillRef idx="1">
+            <a:schemeClr val="accent6"/>
+          </a:fillRef>
+          <a:effectRef idx="0">
+            <a:schemeClr val="accent6"/>
+          </a:effectRef>
+          <a:fontRef idx="minor">
+            <a:schemeClr val="lt1"/>
+          </a:fontRef>
+        </p:style>
+        <p:txBody>
+          <a:bodyPr lIns="58299" tIns="29149" rIns="58299" bIns="29149" rtlCol="0" anchor="ctr"/>
+          <a:lstStyle/>
+          <a:p>
+            <a:pPr algn="ctr"/>
+            <a:endParaRPr lang="ru-RU" sz="900"/>
+          </a:p>
+        </p:txBody>
+      </p:sp>
+      <p:sp>
+        <p:nvSpPr>
+          <p:cNvPr id="401" name="Прямоугольник 400"/>
+          <p:cNvSpPr/>
+          <p:nvPr/>
+        </p:nvSpPr>
+        <p:spPr>
+          <a:xfrm>
+            <a:off x="1034448" y="10658505"/>
+            <a:ext cx="977248" cy="247651"/>
+          </a:xfrm>
+          <a:prstGeom prst="rect">
+            <a:avLst/>
+          </a:prstGeom>
+        </p:spPr>
+        <p:style>
+          <a:lnRef idx="2">
+            <a:schemeClr val="accent3">
+              <a:shade val="50000"/>
+            </a:schemeClr>
+          </a:lnRef>
+          <a:fillRef idx="1">
+            <a:schemeClr val="accent3"/>
+          </a:fillRef>
+          <a:effectRef idx="0">
+            <a:schemeClr val="accent3"/>
+          </a:effectRef>
+          <a:fontRef idx="minor">
+            <a:schemeClr val="lt1"/>
+          </a:fontRef>
+        </p:style>
+        <p:txBody>
+          <a:bodyPr lIns="58299" tIns="29149" rIns="58299" bIns="29149" rtlCol="0" anchor="ctr"/>
+          <a:lstStyle/>
+          <a:p>
+            <a:pPr>
+              <a:buFont typeface="Arial" pitchFamily="34" charset="0"/>
+              <a:buChar char="•"/>
+            </a:pPr>
+            <a:r>
+              <a:rPr lang="en-US" sz="900" smtClean="0">
+                <a:solidFill>
+                  <a:schemeClr val="tx1"/>
+                </a:solidFill>
+              </a:rPr>
+              <a:t>chooseQuizId</a:t>
+            </a:r>
+            <a:endParaRPr lang="ru-RU" sz="900" b="0" baseline="0">
+              <a:solidFill>
+                <a:schemeClr val="tx1"/>
+              </a:solidFill>
+            </a:endParaRPr>
+          </a:p>
+        </p:txBody>
+      </p:sp>
+      <p:sp>
+        <p:nvSpPr>
+          <p:cNvPr id="403" name="Прямоугольник 402"/>
+          <p:cNvSpPr/>
+          <p:nvPr/>
+        </p:nvSpPr>
+        <p:spPr>
+          <a:xfrm>
+            <a:off x="2000201" y="10658505"/>
+            <a:ext cx="965752" cy="247651"/>
+          </a:xfrm>
+          <a:prstGeom prst="rect">
+            <a:avLst/>
+          </a:prstGeom>
+        </p:spPr>
+        <p:style>
+          <a:lnRef idx="2">
+            <a:schemeClr val="accent3">
+              <a:shade val="50000"/>
+            </a:schemeClr>
+          </a:lnRef>
+          <a:fillRef idx="1">
+            <a:schemeClr val="accent3"/>
+          </a:fillRef>
+          <a:effectRef idx="0">
+            <a:schemeClr val="accent3"/>
+          </a:effectRef>
+          <a:fontRef idx="minor">
+            <a:schemeClr val="lt1"/>
+          </a:fontRef>
+        </p:style>
+        <p:txBody>
+          <a:bodyPr lIns="58299" tIns="29149" rIns="58299" bIns="29149" rtlCol="0" anchor="ctr"/>
+          <a:lstStyle/>
+          <a:p>
+            <a:pPr algn="ctr"/>
+            <a:endParaRPr lang="ru-RU" sz="1200"/>
+          </a:p>
+        </p:txBody>
+      </p:sp>
+      <p:sp>
+        <p:nvSpPr>
+          <p:cNvPr id="404" name="Прямоугольник 403"/>
+          <p:cNvSpPr/>
+          <p:nvPr/>
+        </p:nvSpPr>
+        <p:spPr>
+          <a:xfrm>
+            <a:off x="2965953" y="10658504"/>
+            <a:ext cx="854577" cy="214315"/>
+          </a:xfrm>
+          <a:prstGeom prst="rect">
+            <a:avLst/>
+          </a:prstGeom>
+        </p:spPr>
+        <p:style>
+          <a:lnRef idx="2">
+            <a:schemeClr val="accent3">
+              <a:shade val="50000"/>
+            </a:schemeClr>
+          </a:lnRef>
+          <a:fillRef idx="1">
+            <a:schemeClr val="accent3"/>
+          </a:fillRef>
+          <a:effectRef idx="0">
+            <a:schemeClr val="accent3"/>
+          </a:effectRef>
+          <a:fontRef idx="minor">
+            <a:schemeClr val="lt1"/>
+          </a:fontRef>
+        </p:style>
+        <p:txBody>
+          <a:bodyPr lIns="58299" tIns="29149" rIns="58299" bIns="29149" rtlCol="0" anchor="ctr"/>
+          <a:lstStyle/>
+          <a:p>
+            <a:pPr algn="ctr"/>
+            <a:r>
+              <a:rPr lang="en-US" sz="1200" smtClean="0"/>
+              <a:t>func</a:t>
+            </a:r>
+            <a:endParaRPr lang="ru-RU" sz="1200"/>
+          </a:p>
+        </p:txBody>
+      </p:sp>
+      <p:sp>
+        <p:nvSpPr>
+          <p:cNvPr id="405" name="Прямоугольник 404"/>
+          <p:cNvSpPr/>
+          <p:nvPr/>
+        </p:nvSpPr>
+        <p:spPr>
+          <a:xfrm>
+            <a:off x="-3894774" y="6372225"/>
+            <a:ext cx="977248" cy="247651"/>
+          </a:xfrm>
+          <a:prstGeom prst="rect">
+            <a:avLst/>
+          </a:prstGeom>
+        </p:spPr>
+        <p:style>
+          <a:lnRef idx="2">
+            <a:schemeClr val="accent3">
+              <a:shade val="50000"/>
+            </a:schemeClr>
+          </a:lnRef>
+          <a:fillRef idx="1">
+            <a:schemeClr val="accent3"/>
+          </a:fillRef>
+          <a:effectRef idx="0">
+            <a:schemeClr val="accent3"/>
+          </a:effectRef>
+          <a:fontRef idx="minor">
+            <a:schemeClr val="lt1"/>
+          </a:fontRef>
+        </p:style>
+        <p:txBody>
+          <a:bodyPr lIns="58299" tIns="29149" rIns="58299" bIns="29149" rtlCol="0" anchor="ctr"/>
+          <a:lstStyle/>
+          <a:p>
+            <a:pPr>
+              <a:buFont typeface="Arial" pitchFamily="34" charset="0"/>
+              <a:buChar char="•"/>
+            </a:pPr>
+            <a:r>
+              <a:rPr lang="en-US" sz="900" smtClean="0">
+                <a:solidFill>
+                  <a:schemeClr val="tx1"/>
+                </a:solidFill>
+              </a:rPr>
+              <a:t>chooseQuizId</a:t>
+            </a:r>
+            <a:endParaRPr lang="ru-RU" sz="900" b="0" baseline="0">
+              <a:solidFill>
+                <a:schemeClr val="tx1"/>
+              </a:solidFill>
+            </a:endParaRPr>
+          </a:p>
+        </p:txBody>
+      </p:sp>
+      <p:sp>
+        <p:nvSpPr>
+          <p:cNvPr id="406" name="Прямоугольник 405"/>
+          <p:cNvSpPr/>
+          <p:nvPr/>
+        </p:nvSpPr>
+        <p:spPr>
+          <a:xfrm>
+            <a:off x="-2929021" y="6372225"/>
+            <a:ext cx="965752" cy="247651"/>
+          </a:xfrm>
+          <a:prstGeom prst="rect">
+            <a:avLst/>
+          </a:prstGeom>
+        </p:spPr>
+        <p:style>
+          <a:lnRef idx="2">
+            <a:schemeClr val="accent3">
+              <a:shade val="50000"/>
+            </a:schemeClr>
+          </a:lnRef>
+          <a:fillRef idx="1">
+            <a:schemeClr val="accent3"/>
+          </a:fillRef>
+          <a:effectRef idx="0">
+            <a:schemeClr val="accent3"/>
+          </a:effectRef>
+          <a:fontRef idx="minor">
+            <a:schemeClr val="lt1"/>
+          </a:fontRef>
+        </p:style>
+        <p:txBody>
+          <a:bodyPr lIns="58299" tIns="29149" rIns="58299" bIns="29149" rtlCol="0" anchor="ctr"/>
+          <a:lstStyle/>
+          <a:p>
+            <a:pPr algn="ctr"/>
+            <a:endParaRPr lang="ru-RU" sz="1200"/>
+          </a:p>
+        </p:txBody>
+      </p:sp>
+      <p:sp>
+        <p:nvSpPr>
+          <p:cNvPr id="407" name="Прямоугольник 406"/>
+          <p:cNvSpPr/>
+          <p:nvPr/>
+        </p:nvSpPr>
+        <p:spPr>
+          <a:xfrm>
+            <a:off x="-1963269" y="6372224"/>
+            <a:ext cx="854577" cy="214315"/>
+          </a:xfrm>
+          <a:prstGeom prst="rect">
+            <a:avLst/>
+          </a:prstGeom>
+        </p:spPr>
+        <p:style>
+          <a:lnRef idx="2">
+            <a:schemeClr val="accent3">
+              <a:shade val="50000"/>
+            </a:schemeClr>
+          </a:lnRef>
+          <a:fillRef idx="1">
+            <a:schemeClr val="accent3"/>
+          </a:fillRef>
+          <a:effectRef idx="0">
+            <a:schemeClr val="accent3"/>
+          </a:effectRef>
+          <a:fontRef idx="minor">
+            <a:schemeClr val="lt1"/>
+          </a:fontRef>
+        </p:style>
+        <p:txBody>
+          <a:bodyPr lIns="58299" tIns="29149" rIns="58299" bIns="29149" rtlCol="0" anchor="ctr"/>
+          <a:lstStyle/>
+          <a:p>
+            <a:pPr algn="ctr"/>
+            <a:r>
+              <a:rPr lang="en-US" sz="1200" smtClean="0"/>
+              <a:t>func</a:t>
+            </a:r>
+            <a:endParaRPr lang="ru-RU" sz="1200"/>
+          </a:p>
+        </p:txBody>
+      </p:sp>
+      <p:sp>
+        <p:nvSpPr>
+          <p:cNvPr id="408" name="Прямоугольник 407"/>
+          <p:cNvSpPr/>
+          <p:nvPr/>
+        </p:nvSpPr>
+        <p:spPr>
+          <a:xfrm>
+            <a:off x="-7323798" y="6086473"/>
+            <a:ext cx="977248" cy="247651"/>
+          </a:xfrm>
+          <a:prstGeom prst="rect">
+            <a:avLst/>
+          </a:prstGeom>
+        </p:spPr>
+        <p:style>
+          <a:lnRef idx="2">
+            <a:schemeClr val="accent3">
+              <a:shade val="50000"/>
+            </a:schemeClr>
+          </a:lnRef>
+          <a:fillRef idx="1">
+            <a:schemeClr val="accent3"/>
+          </a:fillRef>
+          <a:effectRef idx="0">
+            <a:schemeClr val="accent3"/>
+          </a:effectRef>
+          <a:fontRef idx="minor">
+            <a:schemeClr val="lt1"/>
+          </a:fontRef>
+        </p:style>
+        <p:txBody>
+          <a:bodyPr lIns="58299" tIns="29149" rIns="58299" bIns="29149" rtlCol="0" anchor="ctr"/>
+          <a:lstStyle/>
+          <a:p>
+            <a:pPr>
+              <a:buFont typeface="Arial" pitchFamily="34" charset="0"/>
+              <a:buChar char="•"/>
+            </a:pPr>
+            <a:r>
+              <a:rPr lang="en-US" sz="900" smtClean="0">
+                <a:solidFill>
+                  <a:schemeClr val="tx1"/>
+                </a:solidFill>
+              </a:rPr>
+              <a:t>chooseQuizId</a:t>
+            </a:r>
+            <a:endParaRPr lang="ru-RU" sz="900" b="0" baseline="0">
+              <a:solidFill>
+                <a:schemeClr val="tx1"/>
+              </a:solidFill>
+            </a:endParaRPr>
+          </a:p>
+        </p:txBody>
+      </p:sp>
+      <p:sp>
+        <p:nvSpPr>
+          <p:cNvPr id="419" name="Прямоугольник 418"/>
+          <p:cNvSpPr/>
+          <p:nvPr/>
+        </p:nvSpPr>
+        <p:spPr>
+          <a:xfrm>
+            <a:off x="-6358045" y="6086473"/>
+            <a:ext cx="965752" cy="247651"/>
+          </a:xfrm>
+          <a:prstGeom prst="rect">
+            <a:avLst/>
+          </a:prstGeom>
+        </p:spPr>
+        <p:style>
+          <a:lnRef idx="2">
+            <a:schemeClr val="accent3">
+              <a:shade val="50000"/>
+            </a:schemeClr>
+          </a:lnRef>
+          <a:fillRef idx="1">
+            <a:schemeClr val="accent3"/>
+          </a:fillRef>
+          <a:effectRef idx="0">
+            <a:schemeClr val="accent3"/>
+          </a:effectRef>
+          <a:fontRef idx="minor">
+            <a:schemeClr val="lt1"/>
+          </a:fontRef>
+        </p:style>
+        <p:txBody>
+          <a:bodyPr lIns="58299" tIns="29149" rIns="58299" bIns="29149" rtlCol="0" anchor="ctr"/>
+          <a:lstStyle/>
+          <a:p>
+            <a:pPr algn="ctr"/>
+            <a:endParaRPr lang="ru-RU" sz="1200"/>
+          </a:p>
+        </p:txBody>
+      </p:sp>
+      <p:sp>
+        <p:nvSpPr>
+          <p:cNvPr id="421" name="Прямоугольник 420"/>
+          <p:cNvSpPr/>
+          <p:nvPr/>
+        </p:nvSpPr>
+        <p:spPr>
+          <a:xfrm>
+            <a:off x="-5392293" y="6086472"/>
+            <a:ext cx="854577" cy="214315"/>
+          </a:xfrm>
+          <a:prstGeom prst="rect">
+            <a:avLst/>
+          </a:prstGeom>
+        </p:spPr>
+        <p:style>
+          <a:lnRef idx="2">
+            <a:schemeClr val="accent3">
+              <a:shade val="50000"/>
+            </a:schemeClr>
+          </a:lnRef>
+          <a:fillRef idx="1">
+            <a:schemeClr val="accent3"/>
+          </a:fillRef>
+          <a:effectRef idx="0">
+            <a:schemeClr val="accent3"/>
+          </a:effectRef>
+          <a:fontRef idx="minor">
+            <a:schemeClr val="lt1"/>
+          </a:fontRef>
+        </p:style>
+        <p:txBody>
+          <a:bodyPr lIns="58299" tIns="29149" rIns="58299" bIns="29149" rtlCol="0" anchor="ctr"/>
+          <a:lstStyle/>
+          <a:p>
+            <a:pPr algn="ctr"/>
+            <a:r>
+              <a:rPr lang="en-US" sz="1200" smtClean="0"/>
+              <a:t>func</a:t>
+            </a:r>
+            <a:endParaRPr lang="ru-RU" sz="1200"/>
+          </a:p>
+        </p:txBody>
+      </p:sp>
+      <p:cxnSp>
+        <p:nvCxnSpPr>
+          <p:cNvPr id="425" name="Прямая со стрелкой 424"/>
+          <p:cNvCxnSpPr>
+            <a:stCxn id="421" idx="3"/>
+            <a:endCxn id="405" idx="1"/>
+          </p:cNvCxnSpPr>
+          <p:nvPr/>
+        </p:nvCxnSpPr>
+        <p:spPr>
+          <a:xfrm>
+            <a:off x="-4537716" y="6193630"/>
+            <a:ext cx="642942" cy="302421"/>
+          </a:xfrm>
+          <a:prstGeom prst="straightConnector1">
+            <a:avLst/>
+          </a:prstGeom>
+          <a:ln>
+            <a:tailEnd type="arrow"/>
+          </a:ln>
+        </p:spPr>
+        <p:style>
+          <a:lnRef idx="1">
+            <a:schemeClr val="accent1"/>
+          </a:lnRef>
+          <a:fillRef idx="0">
+            <a:schemeClr val="accent1"/>
+          </a:fillRef>
+          <a:effectRef idx="0">
+            <a:schemeClr val="accent1"/>
+          </a:effectRef>
+          <a:fontRef idx="minor">
+            <a:schemeClr val="tx1"/>
+          </a:fontRef>
+        </p:style>
+      </p:cxnSp>
+      <p:cxnSp>
+        <p:nvCxnSpPr>
+          <p:cNvPr id="433" name="Соединительная линия уступом 432"/>
+          <p:cNvCxnSpPr>
+            <a:stCxn id="407" idx="3"/>
+            <a:endCxn id="401" idx="1"/>
+          </p:cNvCxnSpPr>
+          <p:nvPr/>
+        </p:nvCxnSpPr>
+        <p:spPr>
+          <a:xfrm>
+            <a:off x="-1108692" y="6479382"/>
+            <a:ext cx="2143140" cy="4302949"/>
+          </a:xfrm>
+          <a:prstGeom prst="bentConnector3">
+            <a:avLst>
+              <a:gd name="adj1" fmla="val 50000"/>
+            </a:avLst>
+          </a:prstGeom>
+          <a:ln>
+            <a:solidFill>
+              <a:srgbClr val="FF0000"/>
+            </a:solidFill>
+            <a:tailEnd type="arrow"/>
+          </a:ln>
+        </p:spPr>
+        <p:style>
+          <a:lnRef idx="1">
+            <a:schemeClr val="accent1"/>
+          </a:lnRef>
+          <a:fillRef idx="0">
+            <a:schemeClr val="accent1"/>
+          </a:fillRef>
+          <a:effectRef idx="0">
+            <a:schemeClr val="accent1"/>
+          </a:effectRef>
+          <a:fontRef idx="minor">
+            <a:schemeClr val="tx1"/>
+          </a:fontRef>
+        </p:style>
+      </p:cxnSp>
+      <p:sp>
+        <p:nvSpPr>
+          <p:cNvPr id="435" name="Прямоугольник 434"/>
+          <p:cNvSpPr/>
+          <p:nvPr/>
+        </p:nvSpPr>
+        <p:spPr>
+          <a:xfrm>
+            <a:off x="4534910" y="10301315"/>
+            <a:ext cx="977248" cy="247651"/>
+          </a:xfrm>
+          <a:prstGeom prst="rect">
+            <a:avLst/>
+          </a:prstGeom>
+        </p:spPr>
+        <p:style>
+          <a:lnRef idx="2">
+            <a:schemeClr val="accent3">
+              <a:shade val="50000"/>
+            </a:schemeClr>
+          </a:lnRef>
+          <a:fillRef idx="1">
+            <a:schemeClr val="accent3"/>
+          </a:fillRef>
+          <a:effectRef idx="0">
+            <a:schemeClr val="accent3"/>
+          </a:effectRef>
+          <a:fontRef idx="minor">
+            <a:schemeClr val="lt1"/>
+          </a:fontRef>
+        </p:style>
+        <p:txBody>
+          <a:bodyPr lIns="58299" tIns="29149" rIns="58299" bIns="29149" rtlCol="0" anchor="ctr"/>
+          <a:lstStyle/>
+          <a:p>
+            <a:pPr>
+              <a:buFont typeface="Arial" pitchFamily="34" charset="0"/>
+              <a:buChar char="•"/>
+            </a:pPr>
+            <a:r>
+              <a:rPr lang="en-US" sz="900" smtClean="0">
+                <a:solidFill>
+                  <a:schemeClr val="tx1"/>
+                </a:solidFill>
+              </a:rPr>
+              <a:t>chooseQuizId</a:t>
+            </a:r>
+            <a:endParaRPr lang="ru-RU" sz="900" b="0" baseline="0">
+              <a:solidFill>
+                <a:schemeClr val="tx1"/>
+              </a:solidFill>
+            </a:endParaRPr>
+          </a:p>
+        </p:txBody>
+      </p:sp>
+      <p:sp>
+        <p:nvSpPr>
+          <p:cNvPr id="436" name="Прямоугольник 435"/>
+          <p:cNvSpPr/>
+          <p:nvPr/>
+        </p:nvSpPr>
+        <p:spPr>
+          <a:xfrm>
+            <a:off x="5500663" y="10301315"/>
+            <a:ext cx="965752" cy="247651"/>
+          </a:xfrm>
+          <a:prstGeom prst="rect">
+            <a:avLst/>
+          </a:prstGeom>
+        </p:spPr>
+        <p:style>
+          <a:lnRef idx="2">
+            <a:schemeClr val="accent3">
+              <a:shade val="50000"/>
+            </a:schemeClr>
+          </a:lnRef>
+          <a:fillRef idx="1">
+            <a:schemeClr val="accent3"/>
+          </a:fillRef>
+          <a:effectRef idx="0">
+            <a:schemeClr val="accent3"/>
+          </a:effectRef>
+          <a:fontRef idx="minor">
+            <a:schemeClr val="lt1"/>
+          </a:fontRef>
+        </p:style>
+        <p:txBody>
+          <a:bodyPr lIns="58299" tIns="29149" rIns="58299" bIns="29149" rtlCol="0" anchor="ctr"/>
+          <a:lstStyle/>
+          <a:p>
+            <a:pPr algn="ctr"/>
+            <a:endParaRPr lang="ru-RU" sz="1200"/>
+          </a:p>
+        </p:txBody>
+      </p:sp>
+      <p:sp>
+        <p:nvSpPr>
+          <p:cNvPr id="437" name="Прямоугольник 436"/>
+          <p:cNvSpPr/>
+          <p:nvPr/>
+        </p:nvSpPr>
+        <p:spPr>
+          <a:xfrm>
+            <a:off x="6466415" y="10301314"/>
+            <a:ext cx="854577" cy="214315"/>
+          </a:xfrm>
+          <a:prstGeom prst="rect">
+            <a:avLst/>
+          </a:prstGeom>
+        </p:spPr>
+        <p:style>
+          <a:lnRef idx="2">
+            <a:schemeClr val="accent3">
+              <a:shade val="50000"/>
+            </a:schemeClr>
+          </a:lnRef>
+          <a:fillRef idx="1">
+            <a:schemeClr val="accent3"/>
+          </a:fillRef>
+          <a:effectRef idx="0">
+            <a:schemeClr val="accent3"/>
+          </a:effectRef>
+          <a:fontRef idx="minor">
+            <a:schemeClr val="lt1"/>
+          </a:fontRef>
+        </p:style>
+        <p:txBody>
+          <a:bodyPr lIns="58299" tIns="29149" rIns="58299" bIns="29149" rtlCol="0" anchor="ctr"/>
+          <a:lstStyle/>
+          <a:p>
+            <a:pPr algn="ctr"/>
+            <a:r>
+              <a:rPr lang="en-US" sz="1200" smtClean="0"/>
+              <a:t>func</a:t>
+            </a:r>
+            <a:endParaRPr lang="ru-RU" sz="1200"/>
+          </a:p>
+        </p:txBody>
+      </p:sp>
+      <p:cxnSp>
+        <p:nvCxnSpPr>
+          <p:cNvPr id="453" name="Соединительная линия уступом 452"/>
+          <p:cNvCxnSpPr>
+            <a:stCxn id="404" idx="3"/>
+            <a:endCxn id="435" idx="1"/>
+          </p:cNvCxnSpPr>
+          <p:nvPr/>
+        </p:nvCxnSpPr>
+        <p:spPr>
+          <a:xfrm flipV="1">
+            <a:off x="3820530" y="10425141"/>
+            <a:ext cx="714380" cy="340521"/>
+          </a:xfrm>
+          <a:prstGeom prst="bentConnector3">
+            <a:avLst>
+              <a:gd name="adj1" fmla="val 50000"/>
+            </a:avLst>
+          </a:prstGeom>
+          <a:ln>
+            <a:tailEnd type="arrow"/>
+          </a:ln>
+        </p:spPr>
+        <p:style>
+          <a:lnRef idx="1">
+            <a:schemeClr val="accent1"/>
+          </a:lnRef>
+          <a:fillRef idx="0">
+            <a:schemeClr val="accent1"/>
+          </a:fillRef>
+          <a:effectRef idx="0">
+            <a:schemeClr val="accent1"/>
+          </a:effectRef>
+          <a:fontRef idx="minor">
+            <a:schemeClr val="tx1"/>
+          </a:fontRef>
+        </p:style>
+      </p:cxnSp>
+      <p:cxnSp>
+        <p:nvCxnSpPr>
+          <p:cNvPr id="455" name="Shape 454"/>
+          <p:cNvCxnSpPr>
+            <a:stCxn id="398" idx="3"/>
+            <a:endCxn id="383" idx="1"/>
+          </p:cNvCxnSpPr>
+          <p:nvPr/>
+        </p:nvCxnSpPr>
+        <p:spPr>
+          <a:xfrm flipH="1" flipV="1">
+            <a:off x="-7349076" y="4924415"/>
+            <a:ext cx="14850003" cy="5809192"/>
+          </a:xfrm>
+          <a:prstGeom prst="bentConnector5">
+            <a:avLst>
+              <a:gd name="adj1" fmla="val -1539"/>
+              <a:gd name="adj2" fmla="val -15329"/>
+              <a:gd name="adj3" fmla="val 101539"/>
+            </a:avLst>
+          </a:prstGeom>
+          <a:ln>
+            <a:solidFill>
+              <a:srgbClr val="FF0000"/>
+            </a:solidFill>
+            <a:tailEnd type="arrow"/>
+          </a:ln>
+        </p:spPr>
+        <p:style>
+          <a:lnRef idx="1">
+            <a:schemeClr val="accent1"/>
+          </a:lnRef>
+          <a:fillRef idx="0">
+            <a:schemeClr val="accent1"/>
+          </a:fillRef>
+          <a:effectRef idx="0">
+            <a:schemeClr val="accent1"/>
+          </a:effectRef>
+          <a:fontRef idx="minor">
+            <a:schemeClr val="tx1"/>
+          </a:fontRef>
+        </p:style>
+      </p:cxnSp>
+      <p:cxnSp>
+        <p:nvCxnSpPr>
+          <p:cNvPr id="458" name="Соединительная линия уступом 457"/>
+          <p:cNvCxnSpPr>
+            <a:stCxn id="437" idx="3"/>
+            <a:endCxn id="398" idx="3"/>
+          </p:cNvCxnSpPr>
+          <p:nvPr/>
+        </p:nvCxnSpPr>
+        <p:spPr>
+          <a:xfrm>
+            <a:off x="7320992" y="10408472"/>
+            <a:ext cx="179935" cy="325135"/>
+          </a:xfrm>
+          <a:prstGeom prst="bentConnector3">
+            <a:avLst>
+              <a:gd name="adj1" fmla="val 227046"/>
+            </a:avLst>
+          </a:prstGeom>
+          <a:ln>
+            <a:tailEnd type="arrow"/>
+          </a:ln>
+        </p:spPr>
+        <p:style>
+          <a:lnRef idx="1">
+            <a:schemeClr val="accent1"/>
+          </a:lnRef>
+          <a:fillRef idx="0">
+            <a:schemeClr val="accent1"/>
+          </a:fillRef>
+          <a:effectRef idx="0">
+            <a:schemeClr val="accent1"/>
+          </a:effectRef>
+          <a:fontRef idx="minor">
+            <a:schemeClr val="tx1"/>
+          </a:fontRef>
+        </p:style>
+      </p:cxnSp>
     </p:spTree>
   </p:cSld>
   <p:clrMapOvr>

</xml_diff>